<commit_message>
Updated Builder PPT & Code.
</commit_message>
<xml_diff>
--- a/_Doc/DesignPattern.P2.Creational(Builder).pptx
+++ b/_Doc/DesignPattern.P2.Creational(Builder).pptx
@@ -212,7 +212,7 @@
           <a:p>
             <a:fld id="{E18479FA-1253-41AA-8ABD-DCCC0F2E9FAF}" type="datetimeFigureOut">
               <a:rPr lang="en-US" smtClean="0"/>
-              <a:t>4/22/2015</a:t>
+              <a:t>5/6/2015</a:t>
             </a:fld>
             <a:endParaRPr lang="en-US"/>
           </a:p>
@@ -1126,7 +1126,7 @@
           <a:p>
             <a:fld id="{530820CF-B880-4189-942D-D702A7CBA730}" type="datetimeFigureOut">
               <a:rPr lang="zh-CN" altLang="en-US" smtClean="0"/>
-              <a:t>2015/4/22</a:t>
+              <a:t>2015/5/6</a:t>
             </a:fld>
             <a:endParaRPr lang="zh-CN" altLang="en-US"/>
           </a:p>
@@ -1291,7 +1291,7 @@
           <a:p>
             <a:fld id="{530820CF-B880-4189-942D-D702A7CBA730}" type="datetimeFigureOut">
               <a:rPr lang="zh-CN" altLang="en-US" smtClean="0"/>
-              <a:t>2015/4/22</a:t>
+              <a:t>2015/5/6</a:t>
             </a:fld>
             <a:endParaRPr lang="zh-CN" altLang="en-US"/>
           </a:p>
@@ -1466,7 +1466,7 @@
           <a:p>
             <a:fld id="{530820CF-B880-4189-942D-D702A7CBA730}" type="datetimeFigureOut">
               <a:rPr lang="zh-CN" altLang="en-US" smtClean="0"/>
-              <a:t>2015/4/22</a:t>
+              <a:t>2015/5/6</a:t>
             </a:fld>
             <a:endParaRPr lang="zh-CN" altLang="en-US"/>
           </a:p>
@@ -1631,7 +1631,7 @@
           <a:p>
             <a:fld id="{530820CF-B880-4189-942D-D702A7CBA730}" type="datetimeFigureOut">
               <a:rPr lang="zh-CN" altLang="en-US" smtClean="0"/>
-              <a:t>2015/4/22</a:t>
+              <a:t>2015/5/6</a:t>
             </a:fld>
             <a:endParaRPr lang="zh-CN" altLang="en-US"/>
           </a:p>
@@ -1872,7 +1872,7 @@
           <a:p>
             <a:fld id="{530820CF-B880-4189-942D-D702A7CBA730}" type="datetimeFigureOut">
               <a:rPr lang="zh-CN" altLang="en-US" smtClean="0"/>
-              <a:t>2015/4/22</a:t>
+              <a:t>2015/5/6</a:t>
             </a:fld>
             <a:endParaRPr lang="zh-CN" altLang="en-US"/>
           </a:p>
@@ -2155,7 +2155,7 @@
           <a:p>
             <a:fld id="{530820CF-B880-4189-942D-D702A7CBA730}" type="datetimeFigureOut">
               <a:rPr lang="zh-CN" altLang="en-US" smtClean="0"/>
-              <a:t>2015/4/22</a:t>
+              <a:t>2015/5/6</a:t>
             </a:fld>
             <a:endParaRPr lang="zh-CN" altLang="en-US"/>
           </a:p>
@@ -2572,7 +2572,7 @@
           <a:p>
             <a:fld id="{530820CF-B880-4189-942D-D702A7CBA730}" type="datetimeFigureOut">
               <a:rPr lang="zh-CN" altLang="en-US" smtClean="0"/>
-              <a:t>2015/4/22</a:t>
+              <a:t>2015/5/6</a:t>
             </a:fld>
             <a:endParaRPr lang="zh-CN" altLang="en-US"/>
           </a:p>
@@ -2685,7 +2685,7 @@
           <a:p>
             <a:fld id="{530820CF-B880-4189-942D-D702A7CBA730}" type="datetimeFigureOut">
               <a:rPr lang="zh-CN" altLang="en-US" smtClean="0"/>
-              <a:t>2015/4/22</a:t>
+              <a:t>2015/5/6</a:t>
             </a:fld>
             <a:endParaRPr lang="zh-CN" altLang="en-US"/>
           </a:p>
@@ -2775,7 +2775,7 @@
           <a:p>
             <a:fld id="{530820CF-B880-4189-942D-D702A7CBA730}" type="datetimeFigureOut">
               <a:rPr lang="zh-CN" altLang="en-US" smtClean="0"/>
-              <a:t>2015/4/22</a:t>
+              <a:t>2015/5/6</a:t>
             </a:fld>
             <a:endParaRPr lang="zh-CN" altLang="en-US"/>
           </a:p>
@@ -3047,7 +3047,7 @@
           <a:p>
             <a:fld id="{530820CF-B880-4189-942D-D702A7CBA730}" type="datetimeFigureOut">
               <a:rPr lang="zh-CN" altLang="en-US" smtClean="0"/>
-              <a:t>2015/4/22</a:t>
+              <a:t>2015/5/6</a:t>
             </a:fld>
             <a:endParaRPr lang="zh-CN" altLang="en-US"/>
           </a:p>
@@ -3295,7 +3295,7 @@
           <a:p>
             <a:fld id="{530820CF-B880-4189-942D-D702A7CBA730}" type="datetimeFigureOut">
               <a:rPr lang="zh-CN" altLang="en-US" smtClean="0"/>
-              <a:t>2015/4/22</a:t>
+              <a:t>2015/5/6</a:t>
             </a:fld>
             <a:endParaRPr lang="zh-CN" altLang="en-US"/>
           </a:p>
@@ -3503,7 +3503,7 @@
           <a:p>
             <a:fld id="{530820CF-B880-4189-942D-D702A7CBA730}" type="datetimeFigureOut">
               <a:rPr lang="zh-CN" altLang="en-US" smtClean="0"/>
-              <a:t>2015/4/22</a:t>
+              <a:t>2015/5/6</a:t>
             </a:fld>
             <a:endParaRPr lang="zh-CN" altLang="en-US"/>
           </a:p>
@@ -9189,8 +9189,21 @@
               </a:rPr>
               <a:t>void</a:t>
             </a:r>
-          </a:p>
-          <a:p>
+            <a:r>
+              <a:rPr lang="zh-CN" altLang="en-US" sz="1600" spc="50" dirty="0" smtClean="0">
+                <a:ln w="12700">
+                  <a:noFill/>
+                  <a:prstDash val="solid"/>
+                </a:ln>
+                <a:solidFill>
+                  <a:schemeClr val="accent4"/>
+                </a:solidFill>
+                <a:latin typeface="+mj-lt"/>
+                <a:ea typeface="+mj-ea"/>
+                <a:cs typeface="+mj-cs"/>
+              </a:rPr>
+              <a:t>，构造步骤容易实现</a:t>
+            </a:r>
             <a:endParaRPr lang="en-US" altLang="zh-CN" sz="1600" spc="50" dirty="0" smtClean="0">
               <a:ln w="12700">
                 <a:noFill/>
@@ -9205,6 +9218,20 @@
             </a:endParaRPr>
           </a:p>
           <a:p>
+            <a:endParaRPr lang="en-US" altLang="zh-CN" sz="1600" spc="50" dirty="0" smtClean="0">
+              <a:ln w="12700">
+                <a:noFill/>
+                <a:prstDash val="solid"/>
+              </a:ln>
+              <a:solidFill>
+                <a:schemeClr val="accent4"/>
+              </a:solidFill>
+              <a:latin typeface="+mj-lt"/>
+              <a:ea typeface="+mj-ea"/>
+              <a:cs typeface="+mj-cs"/>
+            </a:endParaRPr>
+          </a:p>
+          <a:p>
             <a:r>
               <a:rPr lang="en-US" altLang="zh-CN" sz="1600" spc="50" dirty="0">
                 <a:ln w="12700">
@@ -9263,7 +9290,37 @@
                 <a:ea typeface="+mj-ea"/>
                 <a:cs typeface="+mj-cs"/>
               </a:rPr>
-              <a:t>更一般的，可能构造步骤依赖于之前已构造部件，即非</a:t>
+              <a:t>更一般</a:t>
+            </a:r>
+            <a:r>
+              <a:rPr lang="zh-CN" altLang="en-US" sz="1600" spc="50" dirty="0" smtClean="0">
+                <a:ln w="12700">
+                  <a:noFill/>
+                  <a:prstDash val="solid"/>
+                </a:ln>
+                <a:solidFill>
+                  <a:schemeClr val="accent4"/>
+                </a:solidFill>
+                <a:latin typeface="+mj-lt"/>
+                <a:ea typeface="+mj-ea"/>
+                <a:cs typeface="+mj-cs"/>
+              </a:rPr>
+              <a:t>的场景，</a:t>
+            </a:r>
+            <a:r>
+              <a:rPr lang="zh-CN" altLang="en-US" sz="1600" spc="50" dirty="0" smtClean="0">
+                <a:ln w="12700">
+                  <a:noFill/>
+                  <a:prstDash val="solid"/>
+                </a:ln>
+                <a:solidFill>
+                  <a:schemeClr val="accent4"/>
+                </a:solidFill>
+                <a:latin typeface="+mj-lt"/>
+                <a:ea typeface="+mj-ea"/>
+                <a:cs typeface="+mj-cs"/>
+              </a:rPr>
+              <a:t>可能构造步骤依赖于之前已构造部件，即非</a:t>
             </a:r>
             <a:r>
               <a:rPr lang="en-US" altLang="zh-CN" sz="1600" spc="50" dirty="0" smtClean="0">
@@ -10234,6 +10291,42 @@
               <a:t>	</a:t>
             </a:r>
             <a:r>
+              <a:rPr lang="en-US" altLang="zh-CN" sz="1600" spc="50" dirty="0" smtClean="0">
+                <a:ln w="12700">
+                  <a:noFill/>
+                  <a:prstDash val="solid"/>
+                </a:ln>
+                <a:solidFill>
+                  <a:schemeClr val="accent4"/>
+                </a:solidFill>
+              </a:rPr>
+              <a:t>Builder</a:t>
+            </a:r>
+            <a:r>
+              <a:rPr lang="zh-CN" altLang="en-US" sz="1600" spc="50" dirty="0">
+                <a:ln w="12700">
+                  <a:noFill/>
+                  <a:prstDash val="solid"/>
+                </a:ln>
+                <a:solidFill>
+                  <a:schemeClr val="accent4"/>
+                </a:solidFill>
+              </a:rPr>
+              <a:t>同时作为</a:t>
+            </a:r>
+            <a:r>
+              <a:rPr lang="en-US" altLang="zh-CN" sz="1600" spc="50" dirty="0" smtClean="0">
+                <a:ln w="12700">
+                  <a:noFill/>
+                  <a:prstDash val="solid"/>
+                </a:ln>
+                <a:solidFill>
+                  <a:schemeClr val="accent4"/>
+                </a:solidFill>
+              </a:rPr>
+              <a:t>Director</a:t>
+            </a:r>
+            <a:r>
               <a:rPr lang="zh-CN" altLang="en-US" sz="1600" spc="50" dirty="0" smtClean="0">
                 <a:ln w="12700">
                   <a:noFill/>
@@ -10243,7 +10336,7 @@
                   <a:schemeClr val="accent4"/>
                 </a:solidFill>
               </a:rPr>
-              <a:t>有</a:t>
+              <a:t>，由</a:t>
             </a:r>
             <a:r>
               <a:rPr lang="en-US" altLang="zh-CN" sz="1600" spc="50" dirty="0" smtClean="0">
@@ -10267,7 +10360,7 @@
                   <a:schemeClr val="accent4"/>
                 </a:solidFill>
               </a:rPr>
-              <a:t>但没有独立的</a:t>
+              <a:t>提供</a:t>
             </a:r>
             <a:r>
               <a:rPr lang="en-US" altLang="zh-CN" sz="1600" spc="50" dirty="0" smtClean="0">
@@ -10279,7 +10372,7 @@
                   <a:schemeClr val="accent4"/>
                 </a:solidFill>
               </a:rPr>
-              <a:t>Director</a:t>
+              <a:t>Construct</a:t>
             </a:r>
             <a:r>
               <a:rPr lang="zh-CN" altLang="en-US" sz="1600" spc="50" dirty="0" smtClean="0">
@@ -10291,19 +10384,7 @@
                   <a:schemeClr val="accent4"/>
                 </a:solidFill>
               </a:rPr>
-              <a:t>（构建过程未分离到</a:t>
-            </a:r>
-            <a:r>
-              <a:rPr lang="en-US" altLang="zh-CN" sz="1600" spc="50" dirty="0" smtClean="0">
-                <a:ln w="12700">
-                  <a:noFill/>
-                  <a:prstDash val="solid"/>
-                </a:ln>
-                <a:solidFill>
-                  <a:schemeClr val="accent4"/>
-                </a:solidFill>
-              </a:rPr>
-              <a:t>Director</a:t>
+              <a:t>方法，封装</a:t>
             </a:r>
             <a:r>
               <a:rPr lang="zh-CN" altLang="en-US" sz="1600" spc="50" dirty="0" smtClean="0">
@@ -10315,7 +10396,7 @@
                   <a:schemeClr val="accent4"/>
                 </a:solidFill>
               </a:rPr>
-              <a:t>）</a:t>
+              <a:t>构建过程</a:t>
             </a:r>
             <a:endParaRPr lang="en-US" altLang="zh-CN" sz="1600" spc="50" dirty="0" smtClean="0">
               <a:ln w="12700">
@@ -10349,7 +10430,19 @@
                   <a:schemeClr val="accent4"/>
                 </a:solidFill>
               </a:rPr>
-              <a:t>	Product</a:t>
+              <a:t>	</a:t>
+            </a:r>
+            <a:r>
+              <a:rPr lang="en-US" altLang="zh-CN" sz="1600" spc="50" dirty="0" smtClean="0">
+                <a:ln w="12700">
+                  <a:noFill/>
+                  <a:prstDash val="solid"/>
+                </a:ln>
+                <a:solidFill>
+                  <a:schemeClr val="accent4"/>
+                </a:solidFill>
+              </a:rPr>
+              <a:t>Product</a:t>
             </a:r>
             <a:r>
               <a:rPr lang="zh-CN" altLang="en-US" sz="1600" spc="50" dirty="0" smtClean="0">
@@ -10361,7 +10454,7 @@
                   <a:schemeClr val="accent4"/>
                 </a:solidFill>
               </a:rPr>
-              <a:t>作为</a:t>
+              <a:t>同时作为</a:t>
             </a:r>
             <a:r>
               <a:rPr lang="en-US" altLang="zh-CN" sz="1600" spc="50" dirty="0" smtClean="0">
@@ -10376,6 +10469,18 @@
               <a:t>Director</a:t>
             </a:r>
             <a:r>
+              <a:rPr lang="zh-CN" altLang="en-US" sz="1600" spc="50" dirty="0">
+                <a:ln w="12700">
+                  <a:noFill/>
+                  <a:prstDash val="solid"/>
+                </a:ln>
+                <a:solidFill>
+                  <a:schemeClr val="accent4"/>
+                </a:solidFill>
+              </a:rPr>
+              <a:t> ，</a:t>
+            </a:r>
+            <a:r>
               <a:rPr lang="zh-CN" altLang="en-US" sz="1600" spc="50" dirty="0" smtClean="0">
                 <a:ln w="12700">
                   <a:noFill/>
@@ -10385,7 +10490,7 @@
                   <a:schemeClr val="accent4"/>
                 </a:solidFill>
               </a:rPr>
-              <a:t>（</a:t>
+              <a:t>由</a:t>
             </a:r>
             <a:r>
               <a:rPr lang="en-US" altLang="zh-CN" sz="1600" spc="50" dirty="0" smtClean="0">
@@ -10400,6 +10505,18 @@
               <a:t>Product</a:t>
             </a:r>
             <a:r>
+              <a:rPr lang="zh-CN" altLang="en-US" sz="1600" spc="50" dirty="0">
+                <a:ln w="12700">
+                  <a:noFill/>
+                  <a:prstDash val="solid"/>
+                </a:ln>
+                <a:solidFill>
+                  <a:schemeClr val="accent4"/>
+                </a:solidFill>
+              </a:rPr>
+              <a:t>自身</a:t>
+            </a:r>
+            <a:r>
               <a:rPr lang="zh-CN" altLang="en-US" sz="1600" spc="50" dirty="0" smtClean="0">
                 <a:ln w="12700">
                   <a:noFill/>
@@ -10409,19 +10526,31 @@
                   <a:schemeClr val="accent4"/>
                 </a:solidFill>
               </a:rPr>
-              <a:t>自己控制构建过程，自己构建自己，</a:t>
-            </a:r>
-            <a:r>
-              <a:rPr lang="zh-CN" altLang="en-US" sz="1600" spc="50" dirty="0">
-                <a:ln w="12700">
-                  <a:noFill/>
-                  <a:prstDash val="solid"/>
-                </a:ln>
-                <a:solidFill>
-                  <a:schemeClr val="accent4"/>
-                </a:solidFill>
-              </a:rPr>
-              <a:t>依赖</a:t>
+              <a:t>控制</a:t>
+            </a:r>
+            <a:r>
+              <a:rPr lang="zh-CN" altLang="en-US" sz="1600" spc="50" dirty="0" smtClean="0">
+                <a:ln w="12700">
+                  <a:noFill/>
+                  <a:prstDash val="solid"/>
+                </a:ln>
+                <a:solidFill>
+                  <a:schemeClr val="accent4"/>
+                </a:solidFill>
+              </a:rPr>
+              <a:t>构建过程</a:t>
+            </a:r>
+            <a:r>
+              <a:rPr lang="zh-CN" altLang="en-US" sz="1600" spc="50" dirty="0" smtClean="0">
+                <a:ln w="12700">
+                  <a:noFill/>
+                  <a:prstDash val="solid"/>
+                </a:ln>
+                <a:solidFill>
+                  <a:schemeClr val="accent4"/>
+                </a:solidFill>
+              </a:rPr>
+              <a:t>，依赖</a:t>
             </a:r>
             <a:r>
               <a:rPr lang="en-US" altLang="zh-CN" sz="1600" spc="50" dirty="0" smtClean="0">
@@ -10445,7 +10574,43 @@
                   <a:schemeClr val="accent4"/>
                 </a:solidFill>
               </a:rPr>
-              <a:t>）</a:t>
+              <a:t>控制细节，</a:t>
+            </a:r>
+            <a:r>
+              <a:rPr lang="zh-CN" altLang="en-US" sz="1600" spc="50" dirty="0" smtClean="0">
+                <a:ln w="12700">
+                  <a:noFill/>
+                  <a:prstDash val="solid"/>
+                </a:ln>
+                <a:solidFill>
+                  <a:schemeClr val="accent4"/>
+                </a:solidFill>
+              </a:rPr>
+              <a:t>自己</a:t>
+            </a:r>
+            <a:r>
+              <a:rPr lang="zh-CN" altLang="en-US" sz="1600" spc="50" dirty="0" smtClean="0">
+                <a:ln w="12700">
+                  <a:noFill/>
+                  <a:prstDash val="solid"/>
+                </a:ln>
+                <a:solidFill>
+                  <a:schemeClr val="accent4"/>
+                </a:solidFill>
+              </a:rPr>
+              <a:t>构建</a:t>
+            </a:r>
+            <a:r>
+              <a:rPr lang="zh-CN" altLang="en-US" sz="1600" spc="50" dirty="0" smtClean="0">
+                <a:ln w="12700">
+                  <a:noFill/>
+                  <a:prstDash val="solid"/>
+                </a:ln>
+                <a:solidFill>
+                  <a:schemeClr val="accent4"/>
+                </a:solidFill>
+              </a:rPr>
+              <a:t>自己</a:t>
             </a:r>
             <a:endParaRPr lang="en-US" altLang="zh-CN" sz="1600" spc="50" dirty="0" smtClean="0">
               <a:ln w="12700">
@@ -14271,19 +14436,7 @@
               <a:rPr lang="zh-CN" altLang="en-US" sz="1900" dirty="0" smtClean="0">
                 <a:effectLst/>
               </a:rPr>
-              <a:t>电脑本身之间存在个体差异，如有的因</a:t>
-            </a:r>
-            <a:r>
-              <a:rPr lang="zh-CN" altLang="en-US" sz="1900" dirty="0" smtClean="0">
-                <a:effectLst/>
-              </a:rPr>
-              <a:t>促销价格打折，</a:t>
-            </a:r>
-            <a:r>
-              <a:rPr lang="zh-CN" altLang="en-US" sz="1900" dirty="0" smtClean="0">
-                <a:effectLst/>
-              </a:rPr>
-              <a:t>有的则有打印机赠品、</a:t>
+              <a:t>电脑本身之间存在个体差异，如有的因促销价格打折，有的则有打印机赠品、</a:t>
             </a:r>
             <a:r>
               <a:rPr lang="en-US" altLang="zh-CN" sz="1900" dirty="0" smtClean="0">
@@ -16823,11 +16976,7 @@
             <a:p>
               <a:r>
                 <a:rPr lang="zh-CN" altLang="en-US" sz="1000" dirty="0" smtClean="0"/>
-                <a:t>。。。。。。。</a:t>
-              </a:r>
-              <a:r>
-                <a:rPr lang="zh-CN" altLang="en-US" sz="1000" dirty="0" smtClean="0"/>
-                <a:t>。</a:t>
+                <a:t>。。。。。。。。</a:t>
               </a:r>
               <a:r>
                 <a:rPr lang="zh-CN" altLang="en-US" sz="1000" dirty="0"/>
@@ -16895,7 +17044,7 @@
         </p:spPr>
         <p:txBody>
           <a:bodyPr vert="horz" rtlCol="0" anchor="ctr">
-            <a:normAutofit fontScale="62500" lnSpcReduction="20000"/>
+            <a:normAutofit fontScale="70000" lnSpcReduction="20000"/>
             <a:scene3d>
               <a:camera prst="orthographicFront"/>
               <a:lightRig rig="soft" dir="t"/>
@@ -17122,7 +17271,56 @@
               <a:rPr lang="zh-CN" altLang="en-US" sz="1900" dirty="0" smtClean="0">
                 <a:effectLst/>
               </a:rPr>
-              <a:t>即使同一种类的部件存在大量共性，却也无法忽略之间的差异，如：</a:t>
+              <a:t>即使同一种类的部件存在大量共性，却也无法忽略之间的差异，如</a:t>
+            </a:r>
+            <a:r>
+              <a:rPr lang="zh-CN" altLang="en-US" sz="1900" dirty="0" smtClean="0">
+                <a:effectLst/>
+              </a:rPr>
+              <a:t>：</a:t>
+            </a:r>
+            <a:r>
+              <a:rPr lang="en-US" altLang="zh-CN" sz="1900" dirty="0" smtClean="0">
+                <a:effectLst/>
+              </a:rPr>
+              <a:t>Intel </a:t>
+            </a:r>
+            <a:r>
+              <a:rPr lang="en-US" altLang="zh-CN" sz="1900" dirty="0" smtClean="0">
+                <a:effectLst/>
+              </a:rPr>
+              <a:t>CPU / AMD CPU</a:t>
+            </a:r>
+          </a:p>
+          <a:p>
+            <a:endParaRPr lang="en-US" altLang="zh-CN" sz="1900" dirty="0">
+              <a:effectLst/>
+            </a:endParaRPr>
+          </a:p>
+          <a:p>
+            <a:r>
+              <a:rPr lang="en-US" altLang="zh-CN" sz="1900" dirty="0" smtClean="0">
+                <a:effectLst/>
+              </a:rPr>
+              <a:t>	</a:t>
+            </a:r>
+            <a:r>
+              <a:rPr lang="zh-CN" altLang="en-US" sz="1900" dirty="0" smtClean="0">
+                <a:effectLst/>
+              </a:rPr>
+              <a:t>复杂部件的差异部分导致</a:t>
+            </a:r>
+            <a:r>
+              <a:rPr lang="en-US" altLang="zh-CN" sz="1900" dirty="0" smtClean="0">
+                <a:effectLst/>
+              </a:rPr>
+              <a:t>Computer</a:t>
+            </a:r>
+            <a:r>
+              <a:rPr lang="zh-CN" altLang="en-US" sz="1900" dirty="0" smtClean="0">
+                <a:effectLst/>
+              </a:rPr>
+              <a:t>个体之间的差异：</a:t>
             </a:r>
             <a:endParaRPr lang="en-US" altLang="zh-CN" sz="1900" dirty="0" smtClean="0">
               <a:effectLst/>
@@ -17138,8 +17336,140 @@
               <a:rPr lang="en-US" altLang="zh-CN" sz="1900" dirty="0" smtClean="0">
                 <a:effectLst/>
               </a:rPr>
-              <a:t>		Intel CPU / AMD CPU</a:t>
-            </a:r>
+              <a:t>		</a:t>
+            </a:r>
+            <a:r>
+              <a:rPr lang="zh-CN" altLang="en-US" sz="1900" dirty="0" smtClean="0">
+                <a:effectLst/>
+              </a:rPr>
+              <a:t>共性</a:t>
+            </a:r>
+            <a:r>
+              <a:rPr lang="en-US" altLang="zh-CN" sz="1900" dirty="0" smtClean="0">
+                <a:effectLst/>
+              </a:rPr>
+              <a:t>: </a:t>
+            </a:r>
+            <a:r>
+              <a:rPr lang="zh-CN" altLang="en-US" sz="1900" dirty="0" smtClean="0">
+                <a:effectLst/>
+              </a:rPr>
+              <a:t>价格</a:t>
+            </a:r>
+            <a:r>
+              <a:rPr lang="en-US" altLang="zh-CN" sz="1900" dirty="0" smtClean="0">
+                <a:effectLst/>
+              </a:rPr>
+              <a:t> </a:t>
+            </a:r>
+            <a:r>
+              <a:rPr lang="en-US" altLang="zh-CN" sz="1900" dirty="0">
+                <a:effectLst/>
+              </a:rPr>
+              <a:t>/ </a:t>
+            </a:r>
+            <a:r>
+              <a:rPr lang="zh-CN" altLang="en-US" sz="1900" dirty="0">
+                <a:effectLst/>
+              </a:rPr>
+              <a:t>好评</a:t>
+            </a:r>
+            <a:r>
+              <a:rPr lang="zh-CN" altLang="en-US" sz="1900" dirty="0" smtClean="0">
+                <a:effectLst/>
+              </a:rPr>
+              <a:t>率 </a:t>
+            </a:r>
+            <a:r>
+              <a:rPr lang="en-US" altLang="zh-CN" sz="1900" dirty="0" smtClean="0">
+                <a:effectLst/>
+              </a:rPr>
+              <a:t>/ </a:t>
+            </a:r>
+            <a:r>
+              <a:rPr lang="zh-CN" altLang="en-US" sz="1900" dirty="0" smtClean="0">
+                <a:effectLst/>
+              </a:rPr>
+              <a:t>部件概要描述</a:t>
+            </a:r>
+            <a:endParaRPr lang="en-US" altLang="zh-CN" sz="1900" dirty="0" smtClean="0">
+              <a:effectLst/>
+            </a:endParaRPr>
+          </a:p>
+          <a:p>
+            <a:r>
+              <a:rPr lang="en-US" altLang="zh-CN" sz="1900" dirty="0">
+                <a:effectLst/>
+              </a:rPr>
+              <a:t>	</a:t>
+            </a:r>
+            <a:r>
+              <a:rPr lang="en-US" altLang="zh-CN" sz="1900" dirty="0" smtClean="0">
+                <a:effectLst/>
+              </a:rPr>
+              <a:t>	</a:t>
+            </a:r>
+            <a:r>
+              <a:rPr lang="zh-CN" altLang="en-US" sz="1900" dirty="0">
+                <a:effectLst/>
+              </a:rPr>
+              <a:t>差异</a:t>
+            </a:r>
+            <a:r>
+              <a:rPr lang="en-US" altLang="zh-CN" sz="1900" dirty="0" smtClean="0">
+                <a:effectLst/>
+              </a:rPr>
+              <a:t>: </a:t>
+            </a:r>
+            <a:r>
+              <a:rPr lang="zh-CN" altLang="en-US" sz="1900" dirty="0" smtClean="0">
+                <a:effectLst/>
+              </a:rPr>
+              <a:t>各种内部部件</a:t>
+            </a:r>
+            <a:endParaRPr lang="en-US" altLang="zh-CN" sz="1900" dirty="0" smtClean="0">
+              <a:effectLst/>
+            </a:endParaRPr>
+          </a:p>
+          <a:p>
+            <a:endParaRPr lang="en-US" altLang="zh-CN" sz="1900" dirty="0" smtClean="0">
+              <a:effectLst/>
+            </a:endParaRPr>
+          </a:p>
+          <a:p>
+            <a:r>
+              <a:rPr lang="en-US" altLang="zh-CN" sz="1900" dirty="0" smtClean="0">
+                <a:effectLst/>
+              </a:rPr>
+              <a:t>	Computer</a:t>
+            </a:r>
+            <a:r>
+              <a:rPr lang="zh-CN" altLang="en-US" sz="1900" dirty="0">
+                <a:effectLst/>
+              </a:rPr>
+              <a:t>本身也</a:t>
+            </a:r>
+            <a:r>
+              <a:rPr lang="zh-CN" altLang="en-US" sz="1900" dirty="0" smtClean="0">
+                <a:effectLst/>
+              </a:rPr>
+              <a:t>存在个体差异</a:t>
+            </a:r>
+            <a:r>
+              <a:rPr lang="zh-CN" altLang="en-US" sz="1900" dirty="0">
+                <a:effectLst/>
+              </a:rPr>
+              <a:t>（</a:t>
+            </a:r>
+            <a:r>
+              <a:rPr lang="zh-CN" altLang="en-US" sz="1900" dirty="0" smtClean="0">
+                <a:effectLst/>
+              </a:rPr>
+              <a:t>赠品、促销价）</a:t>
+            </a:r>
+            <a:endParaRPr lang="en-US" altLang="zh-CN" sz="1900" dirty="0" smtClean="0">
+              <a:effectLst/>
+            </a:endParaRPr>
           </a:p>
           <a:p>
             <a:endParaRPr lang="en-US" altLang="zh-CN" sz="1900" dirty="0">
@@ -17151,415 +17481,241 @@
               <a:rPr lang="en-US" altLang="zh-CN" sz="1900" dirty="0" smtClean="0">
                 <a:effectLst/>
               </a:rPr>
-              <a:t>	</a:t>
+              <a:t>	Computer</a:t>
             </a:r>
             <a:r>
               <a:rPr lang="zh-CN" altLang="en-US" sz="1900" dirty="0" smtClean="0">
                 <a:effectLst/>
               </a:rPr>
-              <a:t>复杂部件的差异部分导致</a:t>
-            </a:r>
-            <a:r>
-              <a:rPr lang="en-US" altLang="zh-CN" sz="1900" dirty="0" smtClean="0">
-                <a:effectLst/>
-              </a:rPr>
-              <a:t>Computer</a:t>
-            </a:r>
-            <a:r>
-              <a:rPr lang="zh-CN" altLang="en-US" sz="1900" dirty="0" smtClean="0">
-                <a:effectLst/>
-              </a:rPr>
-              <a:t>个体之间的差异：</a:t>
+              <a:t>各个部件将因需求变化而剧烈变化</a:t>
             </a:r>
             <a:endParaRPr lang="en-US" altLang="zh-CN" sz="1900" dirty="0" smtClean="0">
               <a:effectLst/>
             </a:endParaRPr>
           </a:p>
           <a:p>
+            <a:endParaRPr lang="en-US" altLang="zh-CN" sz="1900" dirty="0">
+              <a:effectLst/>
+            </a:endParaRPr>
+          </a:p>
+          <a:p>
+            <a:r>
+              <a:rPr lang="en-US" altLang="zh-CN" sz="1900" dirty="0">
+                <a:effectLst/>
+              </a:rPr>
+              <a:t>	</a:t>
+            </a:r>
+            <a:r>
+              <a:rPr lang="en-US" altLang="zh-CN" sz="1900" dirty="0" smtClean="0">
+                <a:effectLst/>
+              </a:rPr>
+              <a:t>Computer</a:t>
+            </a:r>
+            <a:r>
+              <a:rPr lang="zh-CN" altLang="en-US" sz="1900" dirty="0" smtClean="0">
+                <a:effectLst/>
+              </a:rPr>
+              <a:t>组装各个部件</a:t>
+            </a:r>
+            <a:r>
+              <a:rPr lang="zh-CN" altLang="en-US" sz="1900" dirty="0">
+                <a:effectLst/>
+              </a:rPr>
+              <a:t>的算法相对</a:t>
+            </a:r>
+            <a:r>
+              <a:rPr lang="zh-CN" altLang="en-US" sz="1900" dirty="0" smtClean="0">
+                <a:effectLst/>
+              </a:rPr>
+              <a:t>稳定</a:t>
+            </a:r>
+            <a:r>
+              <a:rPr lang="en-US" altLang="zh-CN" sz="1900" dirty="0">
+                <a:effectLst/>
+              </a:rPr>
+              <a:t>: BuildCPU() / BuildMemory() / BuildGraphicCard</a:t>
+            </a:r>
+            <a:r>
+              <a:rPr lang="en-US" altLang="zh-CN" sz="1900" dirty="0" smtClean="0">
+                <a:effectLst/>
+              </a:rPr>
+              <a:t>()…</a:t>
+            </a:r>
             <a:endParaRPr lang="en-US" altLang="zh-CN" sz="1900" dirty="0" smtClean="0">
               <a:effectLst/>
             </a:endParaRPr>
           </a:p>
           <a:p>
+            <a:endParaRPr lang="en-US" altLang="zh-CN" sz="1900" dirty="0">
+              <a:effectLst/>
+            </a:endParaRPr>
+          </a:p>
+          <a:p>
+            <a:r>
+              <a:rPr lang="zh-CN" altLang="en-US" sz="2700" b="1" dirty="0">
+                <a:effectLst/>
+              </a:rPr>
+              <a:t>设计：</a:t>
+            </a:r>
+            <a:r>
+              <a:rPr lang="en-US" altLang="zh-CN" sz="2600" dirty="0">
+                <a:effectLst/>
+              </a:rPr>
+              <a:t>	</a:t>
+            </a:r>
+          </a:p>
+          <a:p>
+            <a:r>
+              <a:rPr lang="en-US" altLang="zh-CN" sz="1900" dirty="0">
+                <a:effectLst/>
+              </a:rPr>
+              <a:t>	</a:t>
+            </a:r>
+            <a:r>
+              <a:rPr lang="zh-CN" altLang="en-US" sz="1900" dirty="0" smtClean="0">
+                <a:effectLst/>
+              </a:rPr>
+              <a:t>无法抽象</a:t>
+            </a:r>
             <a:r>
               <a:rPr lang="en-US" altLang="zh-CN" sz="1900" dirty="0" smtClean="0">
                 <a:effectLst/>
               </a:rPr>
-              <a:t>		</a:t>
+              <a:t>Computer</a:t>
             </a:r>
             <a:r>
               <a:rPr lang="zh-CN" altLang="en-US" sz="1900" dirty="0" smtClean="0">
                 <a:effectLst/>
               </a:rPr>
-              <a:t>共性</a:t>
-            </a:r>
-            <a:r>
-              <a:rPr lang="en-US" altLang="zh-CN" sz="1900" dirty="0" smtClean="0">
-                <a:effectLst/>
-              </a:rPr>
-              <a:t>: </a:t>
-            </a:r>
-            <a:r>
-              <a:rPr lang="zh-CN" altLang="en-US" sz="1900" dirty="0" smtClean="0">
-                <a:effectLst/>
-              </a:rPr>
-              <a:t>价格</a:t>
-            </a:r>
-            <a:r>
-              <a:rPr lang="en-US" altLang="zh-CN" sz="1900" dirty="0" smtClean="0">
-                <a:effectLst/>
-              </a:rPr>
-              <a:t> </a:t>
-            </a:r>
-            <a:r>
-              <a:rPr lang="en-US" altLang="zh-CN" sz="1900" dirty="0">
-                <a:effectLst/>
-              </a:rPr>
-              <a:t>/ </a:t>
-            </a:r>
-            <a:r>
-              <a:rPr lang="zh-CN" altLang="en-US" sz="1900" dirty="0">
-                <a:effectLst/>
-              </a:rPr>
-              <a:t>好评</a:t>
-            </a:r>
-            <a:r>
-              <a:rPr lang="zh-CN" altLang="en-US" sz="1900" dirty="0" smtClean="0">
-                <a:effectLst/>
-              </a:rPr>
-              <a:t>率 </a:t>
-            </a:r>
-            <a:r>
-              <a:rPr lang="en-US" altLang="zh-CN" sz="1900" dirty="0" smtClean="0">
-                <a:effectLst/>
-              </a:rPr>
-              <a:t>/ </a:t>
-            </a:r>
-            <a:r>
-              <a:rPr lang="zh-CN" altLang="en-US" sz="1900" dirty="0" smtClean="0">
-                <a:effectLst/>
-              </a:rPr>
-              <a:t>部件概要描述</a:t>
+              <a:t>及其内部部件</a:t>
             </a:r>
             <a:endParaRPr lang="en-US" altLang="zh-CN" sz="1900" dirty="0" smtClean="0">
               <a:effectLst/>
             </a:endParaRPr>
           </a:p>
           <a:p>
-            <a:r>
-              <a:rPr lang="en-US" altLang="zh-CN" sz="1900" dirty="0">
+            <a:endParaRPr lang="en-US" altLang="zh-CN" sz="1900" dirty="0">
+              <a:effectLst/>
+            </a:endParaRPr>
+          </a:p>
+          <a:p>
+            <a:r>
+              <a:rPr lang="en-US" altLang="zh-CN" sz="1900" dirty="0" smtClean="0">
                 <a:effectLst/>
               </a:rPr>
               <a:t>	</a:t>
             </a:r>
             <a:r>
+              <a:rPr lang="zh-CN" altLang="en-US" sz="1900" dirty="0">
+                <a:effectLst/>
+              </a:rPr>
+              <a:t>将</a:t>
+            </a:r>
+            <a:r>
               <a:rPr lang="en-US" altLang="zh-CN" sz="1900" dirty="0" smtClean="0">
                 <a:effectLst/>
               </a:rPr>
-              <a:t>	</a:t>
+              <a:t>Computer</a:t>
             </a:r>
             <a:r>
               <a:rPr lang="zh-CN" altLang="en-US" sz="1900" dirty="0">
                 <a:effectLst/>
               </a:rPr>
-              <a:t>差异</a:t>
+              <a:t>创建</a:t>
+            </a:r>
+            <a:r>
+              <a:rPr lang="zh-CN" altLang="en-US" sz="1900" dirty="0" smtClean="0">
+                <a:effectLst/>
+              </a:rPr>
+              <a:t>各个部件的逻辑放至生产器</a:t>
             </a:r>
             <a:r>
               <a:rPr lang="en-US" altLang="zh-CN" sz="1900" dirty="0" smtClean="0">
                 <a:effectLst/>
               </a:rPr>
-              <a:t>: </a:t>
+              <a:t>(Builder)</a:t>
             </a:r>
             <a:r>
               <a:rPr lang="zh-CN" altLang="en-US" sz="1900" dirty="0" smtClean="0">
                 <a:effectLst/>
               </a:rPr>
-              <a:t>各种内部部件</a:t>
-            </a:r>
+              <a:t>中</a:t>
+            </a:r>
+            <a:r>
+              <a:rPr lang="en-US" altLang="zh-CN" sz="1900" dirty="0" smtClean="0">
+                <a:effectLst/>
+              </a:rPr>
+              <a:t>, </a:t>
+            </a:r>
+            <a:r>
+              <a:rPr lang="zh-CN" altLang="en-US" sz="1900" dirty="0" smtClean="0">
+                <a:effectLst/>
+              </a:rPr>
+              <a:t>抽象的</a:t>
+            </a:r>
+            <a:r>
+              <a:rPr lang="en-US" altLang="zh-CN" sz="1900" dirty="0" smtClean="0">
+                <a:effectLst/>
+              </a:rPr>
+              <a:t>Builder</a:t>
+            </a:r>
+            <a:r>
+              <a:rPr lang="zh-CN" altLang="en-US" sz="1900" dirty="0" smtClean="0">
+                <a:effectLst/>
+              </a:rPr>
+              <a:t>提供部件创建</a:t>
+            </a:r>
+            <a:r>
+              <a:rPr lang="zh-CN" altLang="en-US" sz="1900" dirty="0" smtClean="0">
+                <a:effectLst/>
+              </a:rPr>
+              <a:t>接口</a:t>
+            </a:r>
+            <a:endParaRPr lang="en-US" altLang="zh-CN" sz="1900" dirty="0">
+              <a:effectLst/>
+            </a:endParaRPr>
+          </a:p>
+          <a:p>
             <a:endParaRPr lang="en-US" altLang="zh-CN" sz="1900" dirty="0" smtClean="0">
               <a:effectLst/>
             </a:endParaRPr>
           </a:p>
           <a:p>
-            <a:endParaRPr lang="en-US" altLang="zh-CN" sz="1900" dirty="0" smtClean="0">
-              <a:effectLst/>
-            </a:endParaRPr>
-          </a:p>
-          <a:p>
+            <a:r>
+              <a:rPr lang="en-US" altLang="zh-CN" sz="1900" dirty="0">
+                <a:effectLst/>
+              </a:rPr>
+              <a:t>	</a:t>
+            </a:r>
+            <a:r>
+              <a:rPr lang="zh-CN" altLang="en-US" sz="1900" dirty="0" smtClean="0">
+                <a:effectLst/>
+              </a:rPr>
+              <a:t>将</a:t>
+            </a:r>
             <a:r>
               <a:rPr lang="en-US" altLang="zh-CN" sz="1900" dirty="0" smtClean="0">
                 <a:effectLst/>
               </a:rPr>
-              <a:t>	Computer</a:t>
-            </a:r>
-            <a:r>
-              <a:rPr lang="zh-CN" altLang="en-US" sz="1900" dirty="0">
-                <a:effectLst/>
-              </a:rPr>
-              <a:t>本身也</a:t>
+              <a:t>Computer</a:t>
             </a:r>
             <a:r>
               <a:rPr lang="zh-CN" altLang="en-US" sz="1900" dirty="0" smtClean="0">
                 <a:effectLst/>
               </a:rPr>
-              <a:t>存在大量个体差异</a:t>
-            </a:r>
-            <a:r>
-              <a:rPr lang="zh-CN" altLang="en-US" sz="1900" dirty="0">
-                <a:effectLst/>
-              </a:rPr>
-              <a:t>（</a:t>
+              <a:t>组装各个部件</a:t>
             </a:r>
             <a:r>
               <a:rPr lang="zh-CN" altLang="en-US" sz="1900" dirty="0" smtClean="0">
                 <a:effectLst/>
               </a:rPr>
-              <a:t>赠品、促销价）</a:t>
-            </a:r>
-            <a:endParaRPr lang="en-US" altLang="zh-CN" sz="1900" dirty="0" smtClean="0">
-              <a:effectLst/>
-            </a:endParaRPr>
-          </a:p>
-          <a:p>
-            <a:endParaRPr lang="en-US" altLang="zh-CN" sz="1900" dirty="0">
-              <a:effectLst/>
-            </a:endParaRPr>
-          </a:p>
-          <a:p>
-            <a:r>
-              <a:rPr lang="en-US" altLang="zh-CN" sz="1900" dirty="0" smtClean="0">
-                <a:effectLst/>
-              </a:rPr>
-              <a:t>	Computer</a:t>
+              <a:t>的流程算法</a:t>
             </a:r>
             <a:r>
               <a:rPr lang="zh-CN" altLang="en-US" sz="1900" dirty="0" smtClean="0">
                 <a:effectLst/>
               </a:rPr>
-              <a:t>各个部件将因需求变化而剧烈变化</a:t>
-            </a:r>
-            <a:endParaRPr lang="en-US" altLang="zh-CN" sz="1900" dirty="0" smtClean="0">
-              <a:effectLst/>
-            </a:endParaRPr>
-          </a:p>
-          <a:p>
-            <a:endParaRPr lang="en-US" altLang="zh-CN" sz="1900" dirty="0">
-              <a:effectLst/>
-            </a:endParaRPr>
-          </a:p>
-          <a:p>
-            <a:r>
-              <a:rPr lang="en-US" altLang="zh-CN" sz="1900" dirty="0">
-                <a:effectLst/>
-              </a:rPr>
-              <a:t>	</a:t>
-            </a:r>
-            <a:r>
-              <a:rPr lang="en-US" altLang="zh-CN" sz="1900" dirty="0" smtClean="0">
-                <a:effectLst/>
-              </a:rPr>
-              <a:t>Computer</a:t>
-            </a:r>
-            <a:r>
-              <a:rPr lang="zh-CN" altLang="en-US" sz="1900" dirty="0" smtClean="0">
-                <a:effectLst/>
-              </a:rPr>
-              <a:t>组装各个部件</a:t>
-            </a:r>
-            <a:r>
-              <a:rPr lang="zh-CN" altLang="en-US" sz="1900" dirty="0">
-                <a:effectLst/>
-              </a:rPr>
-              <a:t>的算法相对</a:t>
-            </a:r>
-            <a:r>
-              <a:rPr lang="zh-CN" altLang="en-US" sz="1900" dirty="0" smtClean="0">
-                <a:effectLst/>
-              </a:rPr>
-              <a:t>稳定</a:t>
-            </a:r>
-            <a:endParaRPr lang="en-US" altLang="zh-CN" sz="1900" dirty="0" smtClean="0">
-              <a:effectLst/>
-            </a:endParaRPr>
-          </a:p>
-          <a:p>
-            <a:endParaRPr lang="en-US" altLang="zh-CN" sz="1900" dirty="0">
-              <a:effectLst/>
-            </a:endParaRPr>
-          </a:p>
-          <a:p>
-            <a:r>
-              <a:rPr lang="zh-CN" altLang="en-US" sz="2700" b="1" dirty="0">
-                <a:effectLst/>
-              </a:rPr>
-              <a:t>设计：</a:t>
-            </a:r>
-            <a:r>
-              <a:rPr lang="en-US" altLang="zh-CN" sz="2600" dirty="0">
-                <a:effectLst/>
-              </a:rPr>
-              <a:t>	</a:t>
-            </a:r>
-          </a:p>
-          <a:p>
-            <a:r>
-              <a:rPr lang="en-US" altLang="zh-CN" sz="1900" dirty="0">
-                <a:effectLst/>
-              </a:rPr>
-              <a:t>	</a:t>
-            </a:r>
-            <a:r>
-              <a:rPr lang="zh-CN" altLang="en-US" sz="1900" dirty="0" smtClean="0">
-                <a:effectLst/>
-              </a:rPr>
-              <a:t>无法抽象</a:t>
-            </a:r>
-            <a:r>
-              <a:rPr lang="en-US" altLang="zh-CN" sz="1900" dirty="0" smtClean="0">
-                <a:effectLst/>
-              </a:rPr>
-              <a:t>Computer</a:t>
-            </a:r>
-            <a:r>
-              <a:rPr lang="zh-CN" altLang="en-US" sz="1900" dirty="0" smtClean="0">
-                <a:effectLst/>
-              </a:rPr>
-              <a:t>及其内部部件</a:t>
-            </a:r>
-            <a:endParaRPr lang="en-US" altLang="zh-CN" sz="1900" dirty="0" smtClean="0">
-              <a:effectLst/>
-            </a:endParaRPr>
-          </a:p>
-          <a:p>
-            <a:endParaRPr lang="en-US" altLang="zh-CN" sz="1900" dirty="0">
-              <a:effectLst/>
-            </a:endParaRPr>
-          </a:p>
-          <a:p>
-            <a:r>
-              <a:rPr lang="en-US" altLang="zh-CN" sz="1900" dirty="0" smtClean="0">
-                <a:effectLst/>
-              </a:rPr>
-              <a:t>	</a:t>
-            </a:r>
-            <a:r>
-              <a:rPr lang="zh-CN" altLang="en-US" sz="1900" dirty="0">
-                <a:effectLst/>
-              </a:rPr>
-              <a:t>将</a:t>
-            </a:r>
-            <a:r>
-              <a:rPr lang="en-US" altLang="zh-CN" sz="1900" dirty="0" smtClean="0">
-                <a:effectLst/>
-              </a:rPr>
-              <a:t>Computer</a:t>
-            </a:r>
-            <a:r>
-              <a:rPr lang="zh-CN" altLang="en-US" sz="1900" dirty="0">
-                <a:effectLst/>
-              </a:rPr>
-              <a:t>创建</a:t>
-            </a:r>
-            <a:r>
-              <a:rPr lang="zh-CN" altLang="en-US" sz="1900" dirty="0" smtClean="0">
-                <a:effectLst/>
-              </a:rPr>
-              <a:t>各个部件的逻辑放至生产器</a:t>
-            </a:r>
-            <a:r>
-              <a:rPr lang="en-US" altLang="zh-CN" sz="1900" dirty="0" smtClean="0">
-                <a:effectLst/>
-              </a:rPr>
-              <a:t>(Builder)</a:t>
-            </a:r>
-            <a:r>
-              <a:rPr lang="zh-CN" altLang="en-US" sz="1900" dirty="0" smtClean="0">
-                <a:effectLst/>
-              </a:rPr>
-              <a:t>中</a:t>
-            </a:r>
-            <a:r>
-              <a:rPr lang="en-US" altLang="zh-CN" sz="1900" dirty="0" smtClean="0">
-                <a:effectLst/>
-              </a:rPr>
-              <a:t>, </a:t>
-            </a:r>
-            <a:r>
-              <a:rPr lang="zh-CN" altLang="en-US" sz="1900" dirty="0" smtClean="0">
-                <a:effectLst/>
-              </a:rPr>
-              <a:t>抽象的</a:t>
-            </a:r>
-            <a:r>
-              <a:rPr lang="en-US" altLang="zh-CN" sz="1900" dirty="0" smtClean="0">
-                <a:effectLst/>
-              </a:rPr>
-              <a:t>Builder</a:t>
-            </a:r>
-            <a:r>
-              <a:rPr lang="zh-CN" altLang="en-US" sz="1900" dirty="0" smtClean="0">
-                <a:effectLst/>
-              </a:rPr>
-              <a:t>提供部件创建接口</a:t>
-            </a:r>
-            <a:r>
-              <a:rPr lang="en-US" altLang="zh-CN" sz="1900" dirty="0" smtClean="0">
-                <a:effectLst/>
-              </a:rPr>
-              <a:t>: </a:t>
-            </a:r>
-          </a:p>
-          <a:p>
-            <a:endParaRPr lang="en-US" altLang="zh-CN" sz="1900" dirty="0" smtClean="0">
-              <a:effectLst/>
-            </a:endParaRPr>
-          </a:p>
-          <a:p>
-            <a:r>
-              <a:rPr lang="en-US" altLang="zh-CN" sz="1900" dirty="0">
-                <a:effectLst/>
-              </a:rPr>
-              <a:t>	</a:t>
-            </a:r>
-            <a:r>
-              <a:rPr lang="en-US" altLang="zh-CN" sz="1900" dirty="0" smtClean="0">
-                <a:effectLst/>
-              </a:rPr>
-              <a:t>	BuildCPU() / BuildMemory() / BuildGraphicCard()…</a:t>
-            </a:r>
-            <a:endParaRPr lang="en-US" altLang="zh-CN" sz="1900" dirty="0">
-              <a:effectLst/>
-            </a:endParaRPr>
-          </a:p>
-          <a:p>
-            <a:endParaRPr lang="en-US" altLang="zh-CN" sz="1900" dirty="0" smtClean="0">
-              <a:effectLst/>
-            </a:endParaRPr>
-          </a:p>
-          <a:p>
-            <a:r>
-              <a:rPr lang="en-US" altLang="zh-CN" sz="1900" dirty="0">
-                <a:effectLst/>
-              </a:rPr>
-              <a:t>	</a:t>
-            </a:r>
-            <a:r>
-              <a:rPr lang="zh-CN" altLang="en-US" sz="1900" dirty="0" smtClean="0">
-                <a:effectLst/>
-              </a:rPr>
-              <a:t>将</a:t>
-            </a:r>
-            <a:r>
-              <a:rPr lang="en-US" altLang="zh-CN" sz="1900" dirty="0" smtClean="0">
-                <a:effectLst/>
-              </a:rPr>
-              <a:t>Computer</a:t>
-            </a:r>
-            <a:r>
-              <a:rPr lang="zh-CN" altLang="en-US" sz="1900" dirty="0" smtClean="0">
-                <a:effectLst/>
-              </a:rPr>
-              <a:t>组装各个部件的流程算法分离到导向器</a:t>
+              <a:t>分离到导向器</a:t>
             </a:r>
             <a:r>
               <a:rPr lang="en-US" altLang="zh-CN" sz="1900" dirty="0" smtClean="0">

</xml_diff>

<commit_message>
Added Prototype.FactoryMethod sample, and also updated Builder PPT by adding an example.
</commit_message>
<xml_diff>
--- a/_Doc/DesignPattern.P2.Creational(Builder).pptx
+++ b/_Doc/DesignPattern.P2.Creational(Builder).pptx
@@ -5,7 +5,7 @@
     <p:sldMasterId id="2147483648" r:id="rId1"/>
   </p:sldMasterIdLst>
   <p:notesMasterIdLst>
-    <p:notesMasterId r:id="rId23"/>
+    <p:notesMasterId r:id="rId25"/>
   </p:notesMasterIdLst>
   <p:sldIdLst>
     <p:sldId id="256" r:id="rId2"/>
@@ -26,9 +26,11 @@
     <p:sldId id="325" r:id="rId17"/>
     <p:sldId id="333" r:id="rId18"/>
     <p:sldId id="315" r:id="rId19"/>
-    <p:sldId id="292" r:id="rId20"/>
-    <p:sldId id="309" r:id="rId21"/>
-    <p:sldId id="281" r:id="rId22"/>
+    <p:sldId id="334" r:id="rId20"/>
+    <p:sldId id="335" r:id="rId21"/>
+    <p:sldId id="292" r:id="rId22"/>
+    <p:sldId id="309" r:id="rId23"/>
+    <p:sldId id="281" r:id="rId24"/>
   </p:sldIdLst>
   <p:sldSz cx="9144000" cy="6858000" type="screen4x3"/>
   <p:notesSz cx="6858000" cy="9144000"/>
@@ -212,7 +214,7 @@
           <a:p>
             <a:fld id="{E18479FA-1253-41AA-8ABD-DCCC0F2E9FAF}" type="datetimeFigureOut">
               <a:rPr lang="en-US" smtClean="0"/>
-              <a:t>5/13/2015</a:t>
+              <a:t>8/14/2015</a:t>
             </a:fld>
             <a:endParaRPr lang="en-US"/>
           </a:p>
@@ -1126,7 +1128,7 @@
           <a:p>
             <a:fld id="{530820CF-B880-4189-942D-D702A7CBA730}" type="datetimeFigureOut">
               <a:rPr lang="zh-CN" altLang="en-US" smtClean="0"/>
-              <a:t>2015/5/13</a:t>
+              <a:t>2015/8/14</a:t>
             </a:fld>
             <a:endParaRPr lang="zh-CN" altLang="en-US"/>
           </a:p>
@@ -1291,7 +1293,7 @@
           <a:p>
             <a:fld id="{530820CF-B880-4189-942D-D702A7CBA730}" type="datetimeFigureOut">
               <a:rPr lang="zh-CN" altLang="en-US" smtClean="0"/>
-              <a:t>2015/5/13</a:t>
+              <a:t>2015/8/14</a:t>
             </a:fld>
             <a:endParaRPr lang="zh-CN" altLang="en-US"/>
           </a:p>
@@ -1466,7 +1468,7 @@
           <a:p>
             <a:fld id="{530820CF-B880-4189-942D-D702A7CBA730}" type="datetimeFigureOut">
               <a:rPr lang="zh-CN" altLang="en-US" smtClean="0"/>
-              <a:t>2015/5/13</a:t>
+              <a:t>2015/8/14</a:t>
             </a:fld>
             <a:endParaRPr lang="zh-CN" altLang="en-US"/>
           </a:p>
@@ -1631,7 +1633,7 @@
           <a:p>
             <a:fld id="{530820CF-B880-4189-942D-D702A7CBA730}" type="datetimeFigureOut">
               <a:rPr lang="zh-CN" altLang="en-US" smtClean="0"/>
-              <a:t>2015/5/13</a:t>
+              <a:t>2015/8/14</a:t>
             </a:fld>
             <a:endParaRPr lang="zh-CN" altLang="en-US"/>
           </a:p>
@@ -1872,7 +1874,7 @@
           <a:p>
             <a:fld id="{530820CF-B880-4189-942D-D702A7CBA730}" type="datetimeFigureOut">
               <a:rPr lang="zh-CN" altLang="en-US" smtClean="0"/>
-              <a:t>2015/5/13</a:t>
+              <a:t>2015/8/14</a:t>
             </a:fld>
             <a:endParaRPr lang="zh-CN" altLang="en-US"/>
           </a:p>
@@ -2155,7 +2157,7 @@
           <a:p>
             <a:fld id="{530820CF-B880-4189-942D-D702A7CBA730}" type="datetimeFigureOut">
               <a:rPr lang="zh-CN" altLang="en-US" smtClean="0"/>
-              <a:t>2015/5/13</a:t>
+              <a:t>2015/8/14</a:t>
             </a:fld>
             <a:endParaRPr lang="zh-CN" altLang="en-US"/>
           </a:p>
@@ -2572,7 +2574,7 @@
           <a:p>
             <a:fld id="{530820CF-B880-4189-942D-D702A7CBA730}" type="datetimeFigureOut">
               <a:rPr lang="zh-CN" altLang="en-US" smtClean="0"/>
-              <a:t>2015/5/13</a:t>
+              <a:t>2015/8/14</a:t>
             </a:fld>
             <a:endParaRPr lang="zh-CN" altLang="en-US"/>
           </a:p>
@@ -2685,7 +2687,7 @@
           <a:p>
             <a:fld id="{530820CF-B880-4189-942D-D702A7CBA730}" type="datetimeFigureOut">
               <a:rPr lang="zh-CN" altLang="en-US" smtClean="0"/>
-              <a:t>2015/5/13</a:t>
+              <a:t>2015/8/14</a:t>
             </a:fld>
             <a:endParaRPr lang="zh-CN" altLang="en-US"/>
           </a:p>
@@ -2775,7 +2777,7 @@
           <a:p>
             <a:fld id="{530820CF-B880-4189-942D-D702A7CBA730}" type="datetimeFigureOut">
               <a:rPr lang="zh-CN" altLang="en-US" smtClean="0"/>
-              <a:t>2015/5/13</a:t>
+              <a:t>2015/8/14</a:t>
             </a:fld>
             <a:endParaRPr lang="zh-CN" altLang="en-US"/>
           </a:p>
@@ -3047,7 +3049,7 @@
           <a:p>
             <a:fld id="{530820CF-B880-4189-942D-D702A7CBA730}" type="datetimeFigureOut">
               <a:rPr lang="zh-CN" altLang="en-US" smtClean="0"/>
-              <a:t>2015/5/13</a:t>
+              <a:t>2015/8/14</a:t>
             </a:fld>
             <a:endParaRPr lang="zh-CN" altLang="en-US"/>
           </a:p>
@@ -3295,7 +3297,7 @@
           <a:p>
             <a:fld id="{530820CF-B880-4189-942D-D702A7CBA730}" type="datetimeFigureOut">
               <a:rPr lang="zh-CN" altLang="en-US" smtClean="0"/>
-              <a:t>2015/5/13</a:t>
+              <a:t>2015/8/14</a:t>
             </a:fld>
             <a:endParaRPr lang="zh-CN" altLang="en-US"/>
           </a:p>
@@ -3503,7 +3505,7 @@
           <a:p>
             <a:fld id="{530820CF-B880-4189-942D-D702A7CBA730}" type="datetimeFigureOut">
               <a:rPr lang="zh-CN" altLang="en-US" smtClean="0"/>
-              <a:t>2015/5/13</a:t>
+              <a:t>2015/8/14</a:t>
             </a:fld>
             <a:endParaRPr lang="zh-CN" altLang="en-US"/>
           </a:p>
@@ -10815,7 +10817,47 @@
                   <a:schemeClr val="accent4"/>
                 </a:solidFill>
               </a:rPr>
-              <a:t>TextConverter</a:t>
+              <a:t>TextConverter(ASCII</a:t>
+            </a:r>
+            <a:r>
+              <a:rPr lang="en-US" altLang="zh-CN" sz="1400" dirty="0">
+                <a:solidFill>
+                  <a:schemeClr val="accent4"/>
+                </a:solidFill>
+              </a:rPr>
+              <a:t>Converter</a:t>
+            </a:r>
+            <a:r>
+              <a:rPr lang="en-US" altLang="zh-CN" sz="1400" dirty="0" smtClean="0">
+                <a:solidFill>
+                  <a:schemeClr val="accent4"/>
+                </a:solidFill>
+              </a:rPr>
+              <a:t>, TeX</a:t>
+            </a:r>
+            <a:r>
+              <a:rPr lang="en-US" altLang="zh-CN" sz="1400" dirty="0">
+                <a:solidFill>
+                  <a:schemeClr val="accent4"/>
+                </a:solidFill>
+              </a:rPr>
+              <a:t>Converter</a:t>
+            </a:r>
+            <a:r>
+              <a:rPr lang="en-US" altLang="zh-CN" sz="1400" dirty="0" smtClean="0">
+                <a:solidFill>
+                  <a:schemeClr val="accent4"/>
+                </a:solidFill>
+              </a:rPr>
+              <a:t>, TextWidget</a:t>
+            </a:r>
+            <a:r>
+              <a:rPr lang="en-US" altLang="zh-CN" sz="1400" dirty="0">
+                <a:solidFill>
+                  <a:schemeClr val="accent4"/>
+                </a:solidFill>
+              </a:rPr>
+              <a:t>Converter)</a:t>
             </a:r>
             <a:endParaRPr lang="en-US" altLang="zh-CN" sz="1400" dirty="0">
               <a:solidFill>
@@ -11084,756 +11126,7 @@
       </p:grpSpPr>
       <p:sp>
         <p:nvSpPr>
-          <p:cNvPr id="2" name="矩形 1"/>
-          <p:cNvSpPr/>
-          <p:nvPr/>
-        </p:nvSpPr>
-        <p:spPr>
-          <a:xfrm>
-            <a:off x="827584" y="1412776"/>
-            <a:ext cx="7632848" cy="5170646"/>
-          </a:xfrm>
-          <a:prstGeom prst="rect">
-            <a:avLst/>
-          </a:prstGeom>
-        </p:spPr>
-        <p:txBody>
-          <a:bodyPr wrap="square">
-            <a:spAutoFit/>
-          </a:bodyPr>
-          <a:lstStyle/>
-          <a:p>
-            <a:r>
-              <a:rPr lang="zh-CN" altLang="en-US" b="1" spc="50" dirty="0">
-                <a:ln w="12700">
-                  <a:noFill/>
-                  <a:prstDash val="solid"/>
-                </a:ln>
-                <a:solidFill>
-                  <a:schemeClr val="accent4"/>
-                </a:solidFill>
-                <a:effectLst>
-                  <a:outerShdw blurRad="38100" dist="38100" dir="2700000" algn="tl">
-                    <a:srgbClr val="000000">
-                      <a:alpha val="43137"/>
-                    </a:srgbClr>
-                  </a:outerShdw>
-                </a:effectLst>
-                <a:latin typeface="+mj-lt"/>
-                <a:ea typeface="+mj-ea"/>
-                <a:cs typeface="+mj-cs"/>
-              </a:rPr>
-              <a:t>共性</a:t>
-            </a:r>
-            <a:r>
-              <a:rPr lang="zh-CN" altLang="en-US" b="1" spc="50" dirty="0" smtClean="0">
-                <a:ln w="12700">
-                  <a:noFill/>
-                  <a:prstDash val="solid"/>
-                </a:ln>
-                <a:solidFill>
-                  <a:schemeClr val="accent4"/>
-                </a:solidFill>
-                <a:effectLst>
-                  <a:outerShdw blurRad="38100" dist="38100" dir="2700000" algn="tl">
-                    <a:srgbClr val="000000">
-                      <a:alpha val="43137"/>
-                    </a:srgbClr>
-                  </a:outerShdw>
-                </a:effectLst>
-                <a:latin typeface="+mj-lt"/>
-                <a:ea typeface="+mj-ea"/>
-                <a:cs typeface="+mj-cs"/>
-              </a:rPr>
-              <a:t>：</a:t>
-            </a:r>
-            <a:endParaRPr lang="en-US" altLang="zh-CN" sz="1400" dirty="0" smtClean="0">
-              <a:solidFill>
-                <a:schemeClr val="accent4"/>
-              </a:solidFill>
-            </a:endParaRPr>
-          </a:p>
-          <a:p>
-            <a:r>
-              <a:rPr lang="en-US" altLang="zh-CN" sz="1400" dirty="0">
-                <a:solidFill>
-                  <a:schemeClr val="accent4"/>
-                </a:solidFill>
-              </a:rPr>
-              <a:t>	</a:t>
-            </a:r>
-            <a:r>
-              <a:rPr lang="zh-CN" altLang="en-US" sz="1400" dirty="0" smtClean="0">
-                <a:solidFill>
-                  <a:schemeClr val="accent4"/>
-                </a:solidFill>
-              </a:rPr>
-              <a:t>创建型，封装了对象的创建</a:t>
-            </a:r>
-            <a:endParaRPr lang="en-US" altLang="zh-CN" sz="1400" dirty="0" smtClean="0">
-              <a:solidFill>
-                <a:schemeClr val="accent4"/>
-              </a:solidFill>
-            </a:endParaRPr>
-          </a:p>
-          <a:p>
-            <a:r>
-              <a:rPr lang="en-US" altLang="zh-CN" sz="1400" dirty="0">
-                <a:solidFill>
-                  <a:schemeClr val="accent4"/>
-                </a:solidFill>
-              </a:rPr>
-              <a:t>	</a:t>
-            </a:r>
-            <a:r>
-              <a:rPr lang="zh-CN" altLang="en-US" sz="1400" dirty="0" smtClean="0">
-                <a:solidFill>
-                  <a:schemeClr val="accent4"/>
-                </a:solidFill>
-              </a:rPr>
-              <a:t>支持扩展产品</a:t>
-            </a:r>
-            <a:r>
-              <a:rPr lang="en-US" altLang="zh-CN" sz="1400" dirty="0">
-                <a:solidFill>
-                  <a:schemeClr val="accent4"/>
-                </a:solidFill>
-              </a:rPr>
-              <a:t> </a:t>
-            </a:r>
-            <a:r>
-              <a:rPr lang="en-US" altLang="zh-CN" sz="1400" dirty="0" smtClean="0">
-                <a:solidFill>
-                  <a:schemeClr val="accent4"/>
-                </a:solidFill>
-              </a:rPr>
-              <a:t>/ </a:t>
-            </a:r>
-            <a:r>
-              <a:rPr lang="zh-CN" altLang="en-US" sz="1400" dirty="0" smtClean="0">
-                <a:solidFill>
-                  <a:schemeClr val="accent4"/>
-                </a:solidFill>
-              </a:rPr>
-              <a:t>产品系列</a:t>
-            </a:r>
-            <a:endParaRPr lang="en-US" altLang="zh-CN" sz="1400" dirty="0" smtClean="0">
-              <a:solidFill>
-                <a:schemeClr val="accent4"/>
-              </a:solidFill>
-            </a:endParaRPr>
-          </a:p>
-          <a:p>
-            <a:endParaRPr lang="zh-CN" altLang="en-US" sz="1400" dirty="0">
-              <a:solidFill>
-                <a:schemeClr val="accent4"/>
-              </a:solidFill>
-            </a:endParaRPr>
-          </a:p>
-          <a:p>
-            <a:r>
-              <a:rPr lang="zh-CN" altLang="en-US" b="1" spc="50" dirty="0">
-                <a:ln w="12700">
-                  <a:noFill/>
-                  <a:prstDash val="solid"/>
-                </a:ln>
-                <a:solidFill>
-                  <a:schemeClr val="accent4"/>
-                </a:solidFill>
-                <a:effectLst>
-                  <a:outerShdw blurRad="38100" dist="38100" dir="2700000" algn="tl">
-                    <a:srgbClr val="000000">
-                      <a:alpha val="43137"/>
-                    </a:srgbClr>
-                  </a:outerShdw>
-                </a:effectLst>
-                <a:latin typeface="+mj-lt"/>
-                <a:ea typeface="+mj-ea"/>
-                <a:cs typeface="+mj-cs"/>
-              </a:rPr>
-              <a:t>差异</a:t>
-            </a:r>
-            <a:r>
-              <a:rPr lang="zh-CN" altLang="en-US" b="1" spc="50" dirty="0" smtClean="0">
-                <a:ln w="12700">
-                  <a:noFill/>
-                  <a:prstDash val="solid"/>
-                </a:ln>
-                <a:solidFill>
-                  <a:schemeClr val="accent4"/>
-                </a:solidFill>
-                <a:effectLst>
-                  <a:outerShdw blurRad="38100" dist="38100" dir="2700000" algn="tl">
-                    <a:srgbClr val="000000">
-                      <a:alpha val="43137"/>
-                    </a:srgbClr>
-                  </a:outerShdw>
-                </a:effectLst>
-                <a:latin typeface="+mj-lt"/>
-                <a:ea typeface="+mj-ea"/>
-                <a:cs typeface="+mj-cs"/>
-              </a:rPr>
-              <a:t>：</a:t>
-            </a:r>
-            <a:endParaRPr lang="en-US" altLang="zh-CN" sz="1400" dirty="0" smtClean="0">
-              <a:solidFill>
-                <a:schemeClr val="accent4"/>
-              </a:solidFill>
-            </a:endParaRPr>
-          </a:p>
-          <a:p>
-            <a:r>
-              <a:rPr lang="en-US" altLang="zh-CN" sz="1400" dirty="0">
-                <a:solidFill>
-                  <a:schemeClr val="accent4"/>
-                </a:solidFill>
-              </a:rPr>
-              <a:t>	</a:t>
-            </a:r>
-            <a:r>
-              <a:rPr lang="en-US" altLang="zh-CN" sz="1400" b="1" dirty="0" smtClean="0">
-                <a:solidFill>
-                  <a:schemeClr val="accent4"/>
-                </a:solidFill>
-              </a:rPr>
-              <a:t>Factory Method</a:t>
-            </a:r>
-            <a:br>
-              <a:rPr lang="en-US" altLang="zh-CN" sz="1400" b="1" dirty="0" smtClean="0">
-                <a:solidFill>
-                  <a:schemeClr val="accent4"/>
-                </a:solidFill>
-              </a:rPr>
-            </a:br>
-            <a:endParaRPr lang="en-US" altLang="zh-CN" sz="1400" b="1" dirty="0" smtClean="0">
-              <a:solidFill>
-                <a:schemeClr val="accent4"/>
-              </a:solidFill>
-            </a:endParaRPr>
-          </a:p>
-          <a:p>
-            <a:r>
-              <a:rPr lang="en-US" altLang="zh-CN" sz="1400" dirty="0">
-                <a:solidFill>
-                  <a:schemeClr val="accent4"/>
-                </a:solidFill>
-              </a:rPr>
-              <a:t>	  </a:t>
-            </a:r>
-            <a:r>
-              <a:rPr lang="en-US" altLang="zh-CN" sz="1400" dirty="0" smtClean="0">
-                <a:solidFill>
-                  <a:schemeClr val="accent4"/>
-                </a:solidFill>
-              </a:rPr>
-              <a:t>   - </a:t>
-            </a:r>
-            <a:r>
-              <a:rPr lang="zh-CN" altLang="en-US" sz="1400" dirty="0" smtClean="0">
-                <a:solidFill>
-                  <a:schemeClr val="accent4"/>
-                </a:solidFill>
-              </a:rPr>
-              <a:t>强调</a:t>
-            </a:r>
-            <a:r>
-              <a:rPr lang="zh-CN" altLang="en-US" sz="1400" dirty="0">
-                <a:solidFill>
-                  <a:schemeClr val="accent4"/>
-                </a:solidFill>
-              </a:rPr>
-              <a:t>为</a:t>
-            </a:r>
-            <a:r>
-              <a:rPr lang="zh-CN" altLang="en-US" sz="1400" dirty="0" smtClean="0">
-                <a:solidFill>
-                  <a:schemeClr val="accent4"/>
-                </a:solidFill>
-              </a:rPr>
-              <a:t>创建单个产品提供</a:t>
-            </a:r>
-            <a:r>
-              <a:rPr lang="zh-CN" altLang="en-US" sz="1400" dirty="0">
-                <a:solidFill>
-                  <a:schemeClr val="accent4"/>
-                </a:solidFill>
-              </a:rPr>
-              <a:t>一个统一的</a:t>
-            </a:r>
-            <a:r>
-              <a:rPr lang="zh-CN" altLang="en-US" sz="1400" dirty="0" smtClean="0">
-                <a:solidFill>
-                  <a:schemeClr val="accent4"/>
-                </a:solidFill>
-              </a:rPr>
-              <a:t>接口</a:t>
-            </a:r>
-            <a:r>
-              <a:rPr lang="en-US" altLang="zh-CN" sz="1400" dirty="0" smtClean="0">
-                <a:solidFill>
-                  <a:schemeClr val="accent4"/>
-                </a:solidFill>
-              </a:rPr>
-              <a:t>(Create())</a:t>
-            </a:r>
-          </a:p>
-          <a:p>
-            <a:r>
-              <a:rPr lang="en-US" altLang="zh-CN" sz="1400" dirty="0">
-                <a:solidFill>
-                  <a:schemeClr val="accent4"/>
-                </a:solidFill>
-              </a:rPr>
-              <a:t>	 </a:t>
-            </a:r>
-            <a:r>
-              <a:rPr lang="en-US" altLang="zh-CN" sz="1400" dirty="0" smtClean="0">
-                <a:solidFill>
-                  <a:schemeClr val="accent4"/>
-                </a:solidFill>
-              </a:rPr>
-              <a:t>    - </a:t>
-            </a:r>
-            <a:r>
-              <a:rPr lang="zh-CN" altLang="en-US" sz="1400" dirty="0" smtClean="0">
-                <a:solidFill>
-                  <a:schemeClr val="accent4"/>
-                </a:solidFill>
-              </a:rPr>
-              <a:t>对产品进行了抽象，支持单个产品的扩展</a:t>
-            </a:r>
-            <a:endParaRPr lang="en-US" altLang="zh-CN" sz="1400" dirty="0" smtClean="0">
-              <a:solidFill>
-                <a:schemeClr val="accent4"/>
-              </a:solidFill>
-            </a:endParaRPr>
-          </a:p>
-          <a:p>
-            <a:r>
-              <a:rPr lang="en-US" altLang="zh-CN" sz="1400" dirty="0">
-                <a:solidFill>
-                  <a:schemeClr val="accent4"/>
-                </a:solidFill>
-              </a:rPr>
-              <a:t>	 </a:t>
-            </a:r>
-            <a:r>
-              <a:rPr lang="en-US" altLang="zh-CN" sz="1400" dirty="0" smtClean="0">
-                <a:solidFill>
-                  <a:schemeClr val="accent4"/>
-                </a:solidFill>
-              </a:rPr>
-              <a:t>    - </a:t>
-            </a:r>
-            <a:r>
-              <a:rPr lang="zh-CN" altLang="en-US" sz="1400" dirty="0" smtClean="0">
-                <a:solidFill>
-                  <a:schemeClr val="accent4"/>
-                </a:solidFill>
-              </a:rPr>
-              <a:t>直接</a:t>
-            </a:r>
-            <a:r>
-              <a:rPr lang="zh-CN" altLang="en-US" sz="1400" dirty="0">
-                <a:solidFill>
-                  <a:schemeClr val="accent4"/>
-                </a:solidFill>
-              </a:rPr>
-              <a:t>返回</a:t>
-            </a:r>
-            <a:r>
-              <a:rPr lang="zh-CN" altLang="en-US" sz="1400" dirty="0" smtClean="0">
-                <a:solidFill>
-                  <a:schemeClr val="accent4"/>
-                </a:solidFill>
-              </a:rPr>
-              <a:t>创建的产品</a:t>
-            </a:r>
-            <a:endParaRPr lang="en-US" altLang="zh-CN" sz="1400" dirty="0">
-              <a:solidFill>
-                <a:schemeClr val="accent4"/>
-              </a:solidFill>
-            </a:endParaRPr>
-          </a:p>
-          <a:p>
-            <a:endParaRPr lang="en-US" altLang="zh-CN" sz="1400" dirty="0">
-              <a:solidFill>
-                <a:schemeClr val="accent4"/>
-              </a:solidFill>
-            </a:endParaRPr>
-          </a:p>
-          <a:p>
-            <a:r>
-              <a:rPr lang="en-US" altLang="zh-CN" sz="1400" dirty="0">
-                <a:solidFill>
-                  <a:schemeClr val="accent4"/>
-                </a:solidFill>
-              </a:rPr>
-              <a:t>	</a:t>
-            </a:r>
-            <a:r>
-              <a:rPr lang="en-US" altLang="zh-CN" sz="1400" b="1" dirty="0">
-                <a:solidFill>
-                  <a:schemeClr val="accent4"/>
-                </a:solidFill>
-              </a:rPr>
-              <a:t>Abstract </a:t>
-            </a:r>
-            <a:r>
-              <a:rPr lang="en-US" altLang="zh-CN" sz="1400" b="1" dirty="0" smtClean="0">
-                <a:solidFill>
-                  <a:schemeClr val="accent4"/>
-                </a:solidFill>
-              </a:rPr>
-              <a:t>Factory</a:t>
-            </a:r>
-            <a:br>
-              <a:rPr lang="en-US" altLang="zh-CN" sz="1400" b="1" dirty="0" smtClean="0">
-                <a:solidFill>
-                  <a:schemeClr val="accent4"/>
-                </a:solidFill>
-              </a:rPr>
-            </a:br>
-            <a:endParaRPr lang="en-US" altLang="zh-CN" sz="1400" b="1" dirty="0">
-              <a:solidFill>
-                <a:schemeClr val="accent4"/>
-              </a:solidFill>
-            </a:endParaRPr>
-          </a:p>
-          <a:p>
-            <a:r>
-              <a:rPr lang="en-US" altLang="zh-CN" sz="1400" dirty="0">
-                <a:solidFill>
-                  <a:schemeClr val="accent4"/>
-                </a:solidFill>
-              </a:rPr>
-              <a:t>	     - </a:t>
-            </a:r>
-            <a:r>
-              <a:rPr lang="zh-CN" altLang="en-US" sz="1400" dirty="0">
-                <a:solidFill>
-                  <a:schemeClr val="accent4"/>
-                </a:solidFill>
-              </a:rPr>
-              <a:t>强调创建一系列产品</a:t>
-            </a:r>
-            <a:r>
-              <a:rPr lang="en-US" altLang="zh-CN" sz="1400" dirty="0">
-                <a:solidFill>
-                  <a:schemeClr val="accent4"/>
-                </a:solidFill>
-              </a:rPr>
-              <a:t>(</a:t>
-            </a:r>
-            <a:r>
-              <a:rPr lang="zh-CN" altLang="en-US" sz="1400" dirty="0">
-                <a:solidFill>
-                  <a:schemeClr val="accent4"/>
-                </a:solidFill>
-              </a:rPr>
-              <a:t>简单或复杂</a:t>
-            </a:r>
-            <a:r>
-              <a:rPr lang="en-US" altLang="zh-CN" sz="1400" dirty="0">
-                <a:solidFill>
-                  <a:schemeClr val="accent4"/>
-                </a:solidFill>
-              </a:rPr>
-              <a:t>)</a:t>
-            </a:r>
-          </a:p>
-          <a:p>
-            <a:r>
-              <a:rPr lang="en-US" altLang="zh-CN" sz="1400" dirty="0">
-                <a:solidFill>
-                  <a:schemeClr val="accent4"/>
-                </a:solidFill>
-              </a:rPr>
-              <a:t>	     - </a:t>
-            </a:r>
-            <a:r>
-              <a:rPr lang="zh-CN" altLang="en-US" sz="1400" dirty="0">
-                <a:solidFill>
-                  <a:schemeClr val="accent4"/>
-                </a:solidFill>
-              </a:rPr>
-              <a:t>对一系列产品进行了</a:t>
-            </a:r>
-            <a:r>
-              <a:rPr lang="zh-CN" altLang="en-US" sz="1400" dirty="0" smtClean="0">
-                <a:solidFill>
-                  <a:schemeClr val="accent4"/>
-                </a:solidFill>
-              </a:rPr>
-              <a:t>抽象，支持一些列产品的扩展</a:t>
-            </a:r>
-            <a:endParaRPr lang="en-US" altLang="zh-CN" sz="1400" dirty="0">
-              <a:solidFill>
-                <a:schemeClr val="accent4"/>
-              </a:solidFill>
-            </a:endParaRPr>
-          </a:p>
-          <a:p>
-            <a:r>
-              <a:rPr lang="en-US" altLang="zh-CN" sz="1400" dirty="0">
-                <a:solidFill>
-                  <a:schemeClr val="accent4"/>
-                </a:solidFill>
-              </a:rPr>
-              <a:t>	     - </a:t>
-            </a:r>
-            <a:r>
-              <a:rPr lang="zh-CN" altLang="en-US" sz="1400" dirty="0">
-                <a:solidFill>
-                  <a:schemeClr val="accent4"/>
-                </a:solidFill>
-              </a:rPr>
-              <a:t>直接返回创建的</a:t>
-            </a:r>
-            <a:r>
-              <a:rPr lang="zh-CN" altLang="en-US" sz="1400" dirty="0" smtClean="0">
-                <a:solidFill>
-                  <a:schemeClr val="accent4"/>
-                </a:solidFill>
-              </a:rPr>
-              <a:t>产品</a:t>
-            </a:r>
-            <a:endParaRPr lang="en-US" altLang="zh-CN" sz="1400" dirty="0" smtClean="0">
-              <a:solidFill>
-                <a:schemeClr val="accent4"/>
-              </a:solidFill>
-            </a:endParaRPr>
-          </a:p>
-          <a:p>
-            <a:endParaRPr lang="en-US" altLang="zh-CN" sz="1400" dirty="0">
-              <a:solidFill>
-                <a:schemeClr val="accent4"/>
-              </a:solidFill>
-            </a:endParaRPr>
-          </a:p>
-          <a:p>
-            <a:r>
-              <a:rPr lang="en-US" altLang="zh-CN" sz="1400" dirty="0">
-                <a:solidFill>
-                  <a:schemeClr val="accent4"/>
-                </a:solidFill>
-              </a:rPr>
-              <a:t>	</a:t>
-            </a:r>
-            <a:r>
-              <a:rPr lang="en-US" altLang="zh-CN" sz="1400" b="1" dirty="0" smtClean="0">
-                <a:solidFill>
-                  <a:schemeClr val="accent4"/>
-                </a:solidFill>
-              </a:rPr>
-              <a:t>Builder</a:t>
-            </a:r>
-            <a:br>
-              <a:rPr lang="en-US" altLang="zh-CN" sz="1400" b="1" dirty="0" smtClean="0">
-                <a:solidFill>
-                  <a:schemeClr val="accent4"/>
-                </a:solidFill>
-              </a:rPr>
-            </a:br>
-            <a:endParaRPr lang="en-US" altLang="zh-CN" sz="1400" b="1" dirty="0">
-              <a:solidFill>
-                <a:schemeClr val="accent4"/>
-              </a:solidFill>
-            </a:endParaRPr>
-          </a:p>
-          <a:p>
-            <a:r>
-              <a:rPr lang="en-US" altLang="zh-CN" sz="1400" dirty="0">
-                <a:solidFill>
-                  <a:schemeClr val="accent4"/>
-                </a:solidFill>
-              </a:rPr>
-              <a:t>	     - </a:t>
-            </a:r>
-            <a:r>
-              <a:rPr lang="zh-CN" altLang="en-US" sz="1400" dirty="0" smtClean="0">
-                <a:solidFill>
-                  <a:schemeClr val="accent4"/>
-                </a:solidFill>
-              </a:rPr>
-              <a:t>强调</a:t>
-            </a:r>
-            <a:r>
-              <a:rPr lang="zh-CN" altLang="en-US" sz="1400" dirty="0">
-                <a:solidFill>
-                  <a:schemeClr val="accent4"/>
-                </a:solidFill>
-              </a:rPr>
-              <a:t>一步一</a:t>
-            </a:r>
-            <a:r>
-              <a:rPr lang="zh-CN" altLang="en-US" sz="1400" dirty="0" smtClean="0">
-                <a:solidFill>
-                  <a:schemeClr val="accent4"/>
-                </a:solidFill>
-              </a:rPr>
-              <a:t>步的创建产品</a:t>
-            </a:r>
-            <a:r>
-              <a:rPr lang="zh-CN" altLang="en-US" sz="1400" dirty="0">
-                <a:solidFill>
-                  <a:schemeClr val="accent4"/>
-                </a:solidFill>
-              </a:rPr>
-              <a:t>，以及产品内部</a:t>
-            </a:r>
-            <a:r>
-              <a:rPr lang="zh-CN" altLang="en-US" sz="1400" dirty="0" smtClean="0">
-                <a:solidFill>
-                  <a:schemeClr val="accent4"/>
-                </a:solidFill>
-              </a:rPr>
-              <a:t>复杂性</a:t>
-            </a:r>
-            <a:endParaRPr lang="en-US" altLang="zh-CN" sz="1400" dirty="0" smtClean="0">
-              <a:solidFill>
-                <a:schemeClr val="accent4"/>
-              </a:solidFill>
-            </a:endParaRPr>
-          </a:p>
-          <a:p>
-            <a:r>
-              <a:rPr lang="en-US" altLang="zh-CN" sz="1400" dirty="0">
-                <a:solidFill>
-                  <a:schemeClr val="accent4"/>
-                </a:solidFill>
-              </a:rPr>
-              <a:t>	</a:t>
-            </a:r>
-            <a:r>
-              <a:rPr lang="en-US" altLang="zh-CN" sz="1400" dirty="0" smtClean="0">
-                <a:solidFill>
-                  <a:schemeClr val="accent4"/>
-                </a:solidFill>
-              </a:rPr>
-              <a:t>     - </a:t>
-            </a:r>
-            <a:r>
-              <a:rPr lang="zh-CN" altLang="en-US" sz="1400" dirty="0" smtClean="0">
-                <a:solidFill>
-                  <a:schemeClr val="accent4"/>
-                </a:solidFill>
-              </a:rPr>
-              <a:t>强调分离产品构建过程及其具体表示，相同的构建过程创建不同的表示</a:t>
-            </a:r>
-            <a:endParaRPr lang="en-US" altLang="zh-CN" sz="1400" dirty="0" smtClean="0">
-              <a:solidFill>
-                <a:schemeClr val="accent4"/>
-              </a:solidFill>
-            </a:endParaRPr>
-          </a:p>
-          <a:p>
-            <a:r>
-              <a:rPr lang="en-US" altLang="zh-CN" sz="1400" dirty="0" smtClean="0">
-                <a:solidFill>
-                  <a:schemeClr val="accent4"/>
-                </a:solidFill>
-              </a:rPr>
-              <a:t>	     - </a:t>
-            </a:r>
-            <a:r>
-              <a:rPr lang="zh-CN" altLang="en-US" sz="1400" dirty="0" smtClean="0">
-                <a:solidFill>
-                  <a:schemeClr val="accent4"/>
-                </a:solidFill>
-              </a:rPr>
-              <a:t>不要求对产品进行抽象，通过扩展</a:t>
-            </a:r>
-            <a:r>
-              <a:rPr lang="en-US" altLang="zh-CN" sz="1400" dirty="0" smtClean="0">
-                <a:solidFill>
-                  <a:schemeClr val="accent4"/>
-                </a:solidFill>
-              </a:rPr>
-              <a:t>Builder</a:t>
-            </a:r>
-            <a:r>
-              <a:rPr lang="zh-CN" altLang="en-US" sz="1400" dirty="0" smtClean="0">
-                <a:solidFill>
-                  <a:schemeClr val="accent4"/>
-                </a:solidFill>
-              </a:rPr>
-              <a:t>来改变产品的内部表示</a:t>
-            </a:r>
-            <a:endParaRPr lang="en-US" altLang="zh-CN" sz="1400" dirty="0" smtClean="0">
-              <a:solidFill>
-                <a:schemeClr val="accent4"/>
-              </a:solidFill>
-            </a:endParaRPr>
-          </a:p>
-          <a:p>
-            <a:r>
-              <a:rPr lang="en-US" altLang="zh-CN" sz="1400" dirty="0">
-                <a:solidFill>
-                  <a:schemeClr val="accent4"/>
-                </a:solidFill>
-              </a:rPr>
-              <a:t>	     - </a:t>
-            </a:r>
-            <a:r>
-              <a:rPr lang="zh-CN" altLang="en-US" sz="1400" dirty="0" smtClean="0">
-                <a:solidFill>
-                  <a:schemeClr val="accent4"/>
-                </a:solidFill>
-              </a:rPr>
-              <a:t>不要求统一的接口</a:t>
-            </a:r>
-            <a:r>
-              <a:rPr lang="en-US" altLang="zh-CN" sz="1400" dirty="0" smtClean="0">
-                <a:solidFill>
-                  <a:schemeClr val="accent4"/>
-                </a:solidFill>
-              </a:rPr>
-              <a:t>(GetProduct())</a:t>
-            </a:r>
-            <a:r>
-              <a:rPr lang="zh-CN" altLang="en-US" sz="1400" dirty="0" smtClean="0">
-                <a:solidFill>
-                  <a:schemeClr val="accent4"/>
-                </a:solidFill>
-              </a:rPr>
-              <a:t>，具体</a:t>
-            </a:r>
-            <a:r>
-              <a:rPr lang="en-US" altLang="zh-CN" sz="1400" dirty="0" smtClean="0">
-                <a:solidFill>
-                  <a:schemeClr val="accent4"/>
-                </a:solidFill>
-              </a:rPr>
-              <a:t>Builder</a:t>
-            </a:r>
-            <a:r>
-              <a:rPr lang="zh-CN" altLang="en-US" sz="1400" dirty="0" smtClean="0">
-                <a:solidFill>
-                  <a:schemeClr val="accent4"/>
-                </a:solidFill>
-              </a:rPr>
-              <a:t>返回具体</a:t>
-            </a:r>
-            <a:r>
-              <a:rPr lang="en-US" altLang="zh-CN" sz="1400" dirty="0" smtClean="0">
-                <a:solidFill>
-                  <a:schemeClr val="accent4"/>
-                </a:solidFill>
-              </a:rPr>
-              <a:t>Product</a:t>
-            </a:r>
-            <a:endParaRPr lang="zh-CN" altLang="en-US" sz="1400" dirty="0">
-              <a:solidFill>
-                <a:schemeClr val="accent4"/>
-              </a:solidFill>
-            </a:endParaRPr>
-          </a:p>
-        </p:txBody>
-      </p:sp>
-      <p:sp>
-        <p:nvSpPr>
-          <p:cNvPr id="3" name="Rectangle 2"/>
+          <p:cNvPr id="9" name="Rectangle 2"/>
           <p:cNvSpPr txBox="1">
             <a:spLocks noChangeArrowheads="1"/>
           </p:cNvSpPr>
@@ -11870,17 +11163,278 @@
           </a:lstStyle>
           <a:p>
             <a:r>
-              <a:rPr lang="en-US" altLang="zh-CN" sz="3200" dirty="0"/>
-              <a:t>Builder &amp; Factory Method &amp; Abstract Factory</a:t>
-            </a:r>
-            <a:endParaRPr lang="zh-CN" altLang="en-US" sz="3200" dirty="0"/>
+              <a:rPr lang="en-US" altLang="zh-CN" dirty="0" smtClean="0"/>
+              <a:t>Example</a:t>
+            </a:r>
+            <a:endParaRPr lang="zh-CN" altLang="en-US" dirty="0"/>
           </a:p>
         </p:txBody>
       </p:sp>
+      <p:sp>
+        <p:nvSpPr>
+          <p:cNvPr id="5" name="矩形 4"/>
+          <p:cNvSpPr/>
+          <p:nvPr/>
+        </p:nvSpPr>
+        <p:spPr>
+          <a:xfrm>
+            <a:off x="827584" y="1340768"/>
+            <a:ext cx="7632848" cy="5355312"/>
+          </a:xfrm>
+          <a:prstGeom prst="rect">
+            <a:avLst/>
+          </a:prstGeom>
+        </p:spPr>
+        <p:txBody>
+          <a:bodyPr wrap="square">
+            <a:spAutoFit/>
+          </a:bodyPr>
+          <a:lstStyle/>
+          <a:p>
+            <a:r>
+              <a:rPr lang="zh-CN" altLang="en-US" b="1" dirty="0" smtClean="0">
+                <a:solidFill>
+                  <a:schemeClr val="accent4"/>
+                </a:solidFill>
+              </a:rPr>
+              <a:t>旅游者违约条款 </a:t>
+            </a:r>
+            <a:r>
+              <a:rPr lang="en-US" altLang="zh-CN" b="1" dirty="0" smtClean="0">
+                <a:solidFill>
+                  <a:schemeClr val="accent4"/>
+                </a:solidFill>
+              </a:rPr>
+              <a:t>&amp; </a:t>
+            </a:r>
+            <a:r>
+              <a:rPr lang="zh-CN" altLang="en-US" b="1" dirty="0" smtClean="0">
+                <a:solidFill>
+                  <a:schemeClr val="accent4"/>
+                </a:solidFill>
+              </a:rPr>
+              <a:t>旅行社违约条款</a:t>
+            </a:r>
+            <a:endParaRPr lang="en-US" altLang="zh-CN" b="1" dirty="0" smtClean="0">
+              <a:solidFill>
+                <a:schemeClr val="accent4"/>
+              </a:solidFill>
+            </a:endParaRPr>
+          </a:p>
+          <a:p>
+            <a:endParaRPr lang="en-US" altLang="zh-CN" b="1" dirty="0">
+              <a:solidFill>
+                <a:schemeClr val="accent4"/>
+              </a:solidFill>
+            </a:endParaRPr>
+          </a:p>
+          <a:p>
+            <a:endParaRPr lang="en-US" altLang="zh-CN" b="1" dirty="0" smtClean="0">
+              <a:solidFill>
+                <a:schemeClr val="accent4"/>
+              </a:solidFill>
+            </a:endParaRPr>
+          </a:p>
+          <a:p>
+            <a:endParaRPr lang="en-US" altLang="zh-CN" b="1" dirty="0">
+              <a:solidFill>
+                <a:schemeClr val="accent4"/>
+              </a:solidFill>
+            </a:endParaRPr>
+          </a:p>
+          <a:p>
+            <a:endParaRPr lang="en-US" altLang="zh-CN" b="1" dirty="0" smtClean="0">
+              <a:solidFill>
+                <a:schemeClr val="accent4"/>
+              </a:solidFill>
+            </a:endParaRPr>
+          </a:p>
+          <a:p>
+            <a:endParaRPr lang="en-US" altLang="zh-CN" sz="1400" b="1" dirty="0">
+              <a:solidFill>
+                <a:schemeClr val="accent4"/>
+              </a:solidFill>
+            </a:endParaRPr>
+          </a:p>
+          <a:p>
+            <a:endParaRPr lang="en-US" altLang="zh-CN" sz="1400" b="1" dirty="0" smtClean="0">
+              <a:solidFill>
+                <a:schemeClr val="accent4"/>
+              </a:solidFill>
+            </a:endParaRPr>
+          </a:p>
+          <a:p>
+            <a:endParaRPr lang="en-US" altLang="zh-CN" sz="1400" b="1" dirty="0">
+              <a:solidFill>
+                <a:schemeClr val="accent4"/>
+              </a:solidFill>
+            </a:endParaRPr>
+          </a:p>
+          <a:p>
+            <a:r>
+              <a:rPr lang="en-US" altLang="zh-CN" sz="1400" b="1" dirty="0" smtClean="0">
+                <a:solidFill>
+                  <a:schemeClr val="accent4"/>
+                </a:solidFill>
+              </a:rPr>
+              <a:t/>
+            </a:r>
+            <a:br>
+              <a:rPr lang="en-US" altLang="zh-CN" sz="1400" b="1" dirty="0" smtClean="0">
+                <a:solidFill>
+                  <a:schemeClr val="accent4"/>
+                </a:solidFill>
+              </a:rPr>
+            </a:br>
+            <a:endParaRPr lang="en-US" altLang="zh-CN" sz="1400" b="1" dirty="0" smtClean="0">
+              <a:solidFill>
+                <a:schemeClr val="accent4"/>
+              </a:solidFill>
+            </a:endParaRPr>
+          </a:p>
+          <a:p>
+            <a:endParaRPr lang="en-US" altLang="zh-CN" sz="1400" dirty="0" smtClean="0">
+              <a:solidFill>
+                <a:schemeClr val="accent4"/>
+              </a:solidFill>
+            </a:endParaRPr>
+          </a:p>
+          <a:p>
+            <a:endParaRPr lang="en-US" altLang="zh-CN" sz="1400" dirty="0">
+              <a:solidFill>
+                <a:schemeClr val="accent4"/>
+              </a:solidFill>
+            </a:endParaRPr>
+          </a:p>
+          <a:p>
+            <a:endParaRPr lang="en-US" altLang="zh-CN" sz="1400" dirty="0">
+              <a:solidFill>
+                <a:schemeClr val="accent4"/>
+              </a:solidFill>
+            </a:endParaRPr>
+          </a:p>
+          <a:p>
+            <a:endParaRPr lang="en-US" altLang="zh-CN" sz="1400" b="1" dirty="0" smtClean="0">
+              <a:solidFill>
+                <a:schemeClr val="accent4"/>
+              </a:solidFill>
+            </a:endParaRPr>
+          </a:p>
+          <a:p>
+            <a:endParaRPr lang="en-US" altLang="zh-CN" sz="1400" b="1" dirty="0" smtClean="0">
+              <a:solidFill>
+                <a:schemeClr val="accent4"/>
+              </a:solidFill>
+            </a:endParaRPr>
+          </a:p>
+          <a:p>
+            <a:endParaRPr lang="en-US" altLang="zh-CN" sz="1400" b="1" dirty="0">
+              <a:solidFill>
+                <a:schemeClr val="accent4"/>
+              </a:solidFill>
+            </a:endParaRPr>
+          </a:p>
+          <a:p>
+            <a:r>
+              <a:rPr lang="en-US" altLang="zh-CN" sz="1400" b="1" dirty="0">
+                <a:solidFill>
+                  <a:schemeClr val="accent4"/>
+                </a:solidFill>
+              </a:rPr>
+              <a:t> </a:t>
+            </a:r>
+            <a:r>
+              <a:rPr lang="en-US" altLang="zh-CN" sz="1400" b="1" dirty="0" smtClean="0">
+                <a:solidFill>
+                  <a:schemeClr val="accent4"/>
+                </a:solidFill>
+              </a:rPr>
+              <a:t>         </a:t>
+            </a:r>
+            <a:endParaRPr lang="en-US" altLang="zh-CN" sz="1400" b="1" dirty="0">
+              <a:solidFill>
+                <a:schemeClr val="accent4"/>
+              </a:solidFill>
+            </a:endParaRPr>
+          </a:p>
+          <a:p>
+            <a:endParaRPr lang="en-US" altLang="zh-CN" sz="1400" b="1" dirty="0" smtClean="0">
+              <a:solidFill>
+                <a:schemeClr val="accent4"/>
+              </a:solidFill>
+            </a:endParaRPr>
+          </a:p>
+          <a:p>
+            <a:endParaRPr lang="en-US" altLang="zh-CN" sz="1400" b="1" dirty="0">
+              <a:solidFill>
+                <a:schemeClr val="accent4"/>
+              </a:solidFill>
+            </a:endParaRPr>
+          </a:p>
+          <a:p>
+            <a:endParaRPr lang="en-US" altLang="zh-CN" sz="1400" b="1" dirty="0" smtClean="0">
+              <a:solidFill>
+                <a:schemeClr val="accent4"/>
+              </a:solidFill>
+            </a:endParaRPr>
+          </a:p>
+          <a:p>
+            <a:endParaRPr lang="en-US" altLang="zh-CN" sz="1400" b="1" dirty="0">
+              <a:solidFill>
+                <a:schemeClr val="accent4"/>
+              </a:solidFill>
+            </a:endParaRPr>
+          </a:p>
+          <a:p>
+            <a:r>
+              <a:rPr lang="en-US" altLang="zh-CN" sz="1400" dirty="0">
+                <a:solidFill>
+                  <a:schemeClr val="accent4"/>
+                </a:solidFill>
+              </a:rPr>
+              <a:t>	    </a:t>
+            </a:r>
+            <a:endParaRPr lang="en-US" altLang="zh-CN" sz="1400" dirty="0" smtClean="0">
+              <a:solidFill>
+                <a:schemeClr val="accent4"/>
+              </a:solidFill>
+            </a:endParaRPr>
+          </a:p>
+          <a:p>
+            <a:endParaRPr lang="en-US" altLang="zh-CN" sz="1400" dirty="0">
+              <a:solidFill>
+                <a:schemeClr val="accent4"/>
+              </a:solidFill>
+            </a:endParaRPr>
+          </a:p>
+        </p:txBody>
+      </p:sp>
+      <p:pic>
+        <p:nvPicPr>
+          <p:cNvPr id="6" name="图片 5"/>
+          <p:cNvPicPr/>
+          <p:nvPr/>
+        </p:nvPicPr>
+        <p:blipFill>
+          <a:blip r:embed="rId2"/>
+          <a:stretch>
+            <a:fillRect/>
+          </a:stretch>
+        </p:blipFill>
+        <p:spPr>
+          <a:xfrm>
+            <a:off x="1385922" y="2132856"/>
+            <a:ext cx="6354430" cy="3456384"/>
+          </a:xfrm>
+          <a:prstGeom prst="rect">
+            <a:avLst/>
+          </a:prstGeom>
+        </p:spPr>
+      </p:pic>
     </p:spTree>
     <p:extLst>
       <p:ext uri="{BB962C8B-B14F-4D97-AF65-F5344CB8AC3E}">
-        <p14:creationId xmlns:p14="http://schemas.microsoft.com/office/powerpoint/2010/main" val="2747582457"/>
+        <p14:creationId xmlns:p14="http://schemas.microsoft.com/office/powerpoint/2010/main" val="1783340589"/>
       </p:ext>
     </p:extLst>
   </p:cSld>
@@ -12192,6 +11746,1425 @@
       </p:grpSpPr>
       <p:sp>
         <p:nvSpPr>
+          <p:cNvPr id="9" name="Rectangle 2"/>
+          <p:cNvSpPr txBox="1">
+            <a:spLocks noChangeArrowheads="1"/>
+          </p:cNvSpPr>
+          <p:nvPr/>
+        </p:nvSpPr>
+        <p:spPr>
+          <a:xfrm>
+            <a:off x="628650" y="44624"/>
+            <a:ext cx="7886700" cy="1119658"/>
+          </a:xfrm>
+          <a:prstGeom prst="rect">
+            <a:avLst/>
+          </a:prstGeom>
+        </p:spPr>
+        <p:txBody>
+          <a:bodyPr vert="horz" lIns="91440" tIns="45720" rIns="91440" bIns="45720" rtlCol="0" anchor="ctr">
+            <a:normAutofit/>
+          </a:bodyPr>
+          <a:lstStyle>
+            <a:lvl1pPr algn="ctr" defTabSz="914400" rtl="0" eaLnBrk="1" latinLnBrk="0" hangingPunct="1">
+              <a:spcBef>
+                <a:spcPct val="0"/>
+              </a:spcBef>
+              <a:buNone/>
+              <a:defRPr sz="4400" kern="1200">
+                <a:solidFill>
+                  <a:schemeClr val="tx1"/>
+                </a:solidFill>
+                <a:latin typeface="+mj-lt"/>
+                <a:ea typeface="+mj-ea"/>
+                <a:cs typeface="+mj-cs"/>
+              </a:defRPr>
+            </a:lvl1pPr>
+          </a:lstStyle>
+          <a:p>
+            <a:r>
+              <a:rPr lang="en-US" altLang="zh-CN" dirty="0" smtClean="0"/>
+              <a:t>Example</a:t>
+            </a:r>
+            <a:endParaRPr lang="zh-CN" altLang="en-US" dirty="0"/>
+          </a:p>
+        </p:txBody>
+      </p:sp>
+      <p:sp>
+        <p:nvSpPr>
+          <p:cNvPr id="5" name="矩形 4"/>
+          <p:cNvSpPr/>
+          <p:nvPr/>
+        </p:nvSpPr>
+        <p:spPr>
+          <a:xfrm>
+            <a:off x="827584" y="1340768"/>
+            <a:ext cx="7632848" cy="5355312"/>
+          </a:xfrm>
+          <a:prstGeom prst="rect">
+            <a:avLst/>
+          </a:prstGeom>
+        </p:spPr>
+        <p:txBody>
+          <a:bodyPr wrap="square">
+            <a:spAutoFit/>
+          </a:bodyPr>
+          <a:lstStyle/>
+          <a:p>
+            <a:r>
+              <a:rPr lang="en-US" altLang="zh-CN" b="1" dirty="0" smtClean="0">
+                <a:solidFill>
+                  <a:schemeClr val="accent4"/>
+                </a:solidFill>
+              </a:rPr>
+              <a:t>RenegeBuilder</a:t>
+            </a:r>
+          </a:p>
+          <a:p>
+            <a:endParaRPr lang="en-US" altLang="zh-CN" b="1" dirty="0">
+              <a:solidFill>
+                <a:schemeClr val="accent4"/>
+              </a:solidFill>
+            </a:endParaRPr>
+          </a:p>
+          <a:p>
+            <a:endParaRPr lang="en-US" altLang="zh-CN" b="1" dirty="0" smtClean="0">
+              <a:solidFill>
+                <a:schemeClr val="accent4"/>
+              </a:solidFill>
+            </a:endParaRPr>
+          </a:p>
+          <a:p>
+            <a:endParaRPr lang="en-US" altLang="zh-CN" b="1" dirty="0">
+              <a:solidFill>
+                <a:schemeClr val="accent4"/>
+              </a:solidFill>
+            </a:endParaRPr>
+          </a:p>
+          <a:p>
+            <a:endParaRPr lang="en-US" altLang="zh-CN" b="1" dirty="0" smtClean="0">
+              <a:solidFill>
+                <a:schemeClr val="accent4"/>
+              </a:solidFill>
+            </a:endParaRPr>
+          </a:p>
+          <a:p>
+            <a:endParaRPr lang="en-US" altLang="zh-CN" sz="1400" b="1" dirty="0">
+              <a:solidFill>
+                <a:schemeClr val="accent4"/>
+              </a:solidFill>
+            </a:endParaRPr>
+          </a:p>
+          <a:p>
+            <a:endParaRPr lang="en-US" altLang="zh-CN" sz="1400" b="1" dirty="0" smtClean="0">
+              <a:solidFill>
+                <a:schemeClr val="accent4"/>
+              </a:solidFill>
+            </a:endParaRPr>
+          </a:p>
+          <a:p>
+            <a:endParaRPr lang="en-US" altLang="zh-CN" sz="1400" b="1" dirty="0">
+              <a:solidFill>
+                <a:schemeClr val="accent4"/>
+              </a:solidFill>
+            </a:endParaRPr>
+          </a:p>
+          <a:p>
+            <a:r>
+              <a:rPr lang="en-US" altLang="zh-CN" sz="1400" b="1" dirty="0" smtClean="0">
+                <a:solidFill>
+                  <a:schemeClr val="accent4"/>
+                </a:solidFill>
+              </a:rPr>
+              <a:t/>
+            </a:r>
+            <a:br>
+              <a:rPr lang="en-US" altLang="zh-CN" sz="1400" b="1" dirty="0" smtClean="0">
+                <a:solidFill>
+                  <a:schemeClr val="accent4"/>
+                </a:solidFill>
+              </a:rPr>
+            </a:br>
+            <a:endParaRPr lang="en-US" altLang="zh-CN" sz="1400" b="1" dirty="0" smtClean="0">
+              <a:solidFill>
+                <a:schemeClr val="accent4"/>
+              </a:solidFill>
+            </a:endParaRPr>
+          </a:p>
+          <a:p>
+            <a:endParaRPr lang="en-US" altLang="zh-CN" sz="1400" dirty="0" smtClean="0">
+              <a:solidFill>
+                <a:schemeClr val="accent4"/>
+              </a:solidFill>
+            </a:endParaRPr>
+          </a:p>
+          <a:p>
+            <a:endParaRPr lang="en-US" altLang="zh-CN" sz="1400" dirty="0">
+              <a:solidFill>
+                <a:schemeClr val="accent4"/>
+              </a:solidFill>
+            </a:endParaRPr>
+          </a:p>
+          <a:p>
+            <a:endParaRPr lang="en-US" altLang="zh-CN" sz="1400" dirty="0">
+              <a:solidFill>
+                <a:schemeClr val="accent4"/>
+              </a:solidFill>
+            </a:endParaRPr>
+          </a:p>
+          <a:p>
+            <a:endParaRPr lang="en-US" altLang="zh-CN" sz="1400" b="1" dirty="0" smtClean="0">
+              <a:solidFill>
+                <a:schemeClr val="accent4"/>
+              </a:solidFill>
+            </a:endParaRPr>
+          </a:p>
+          <a:p>
+            <a:endParaRPr lang="en-US" altLang="zh-CN" sz="1400" b="1" dirty="0" smtClean="0">
+              <a:solidFill>
+                <a:schemeClr val="accent4"/>
+              </a:solidFill>
+            </a:endParaRPr>
+          </a:p>
+          <a:p>
+            <a:endParaRPr lang="en-US" altLang="zh-CN" sz="1400" b="1" dirty="0">
+              <a:solidFill>
+                <a:schemeClr val="accent4"/>
+              </a:solidFill>
+            </a:endParaRPr>
+          </a:p>
+          <a:p>
+            <a:r>
+              <a:rPr lang="en-US" altLang="zh-CN" sz="1400" b="1" dirty="0">
+                <a:solidFill>
+                  <a:schemeClr val="accent4"/>
+                </a:solidFill>
+              </a:rPr>
+              <a:t> </a:t>
+            </a:r>
+            <a:r>
+              <a:rPr lang="en-US" altLang="zh-CN" sz="1400" b="1" dirty="0" smtClean="0">
+                <a:solidFill>
+                  <a:schemeClr val="accent4"/>
+                </a:solidFill>
+              </a:rPr>
+              <a:t>         </a:t>
+            </a:r>
+            <a:endParaRPr lang="en-US" altLang="zh-CN" sz="1400" b="1" dirty="0">
+              <a:solidFill>
+                <a:schemeClr val="accent4"/>
+              </a:solidFill>
+            </a:endParaRPr>
+          </a:p>
+          <a:p>
+            <a:endParaRPr lang="en-US" altLang="zh-CN" sz="1400" b="1" dirty="0" smtClean="0">
+              <a:solidFill>
+                <a:schemeClr val="accent4"/>
+              </a:solidFill>
+            </a:endParaRPr>
+          </a:p>
+          <a:p>
+            <a:endParaRPr lang="en-US" altLang="zh-CN" sz="1400" b="1" dirty="0">
+              <a:solidFill>
+                <a:schemeClr val="accent4"/>
+              </a:solidFill>
+            </a:endParaRPr>
+          </a:p>
+          <a:p>
+            <a:endParaRPr lang="en-US" altLang="zh-CN" sz="1400" b="1" dirty="0" smtClean="0">
+              <a:solidFill>
+                <a:schemeClr val="accent4"/>
+              </a:solidFill>
+            </a:endParaRPr>
+          </a:p>
+          <a:p>
+            <a:endParaRPr lang="en-US" altLang="zh-CN" sz="1400" b="1" dirty="0">
+              <a:solidFill>
+                <a:schemeClr val="accent4"/>
+              </a:solidFill>
+            </a:endParaRPr>
+          </a:p>
+          <a:p>
+            <a:r>
+              <a:rPr lang="en-US" altLang="zh-CN" sz="1400" dirty="0">
+                <a:solidFill>
+                  <a:schemeClr val="accent4"/>
+                </a:solidFill>
+              </a:rPr>
+              <a:t>	    </a:t>
+            </a:r>
+            <a:endParaRPr lang="en-US" altLang="zh-CN" sz="1400" dirty="0" smtClean="0">
+              <a:solidFill>
+                <a:schemeClr val="accent4"/>
+              </a:solidFill>
+            </a:endParaRPr>
+          </a:p>
+          <a:p>
+            <a:endParaRPr lang="en-US" altLang="zh-CN" sz="1400" dirty="0">
+              <a:solidFill>
+                <a:schemeClr val="accent4"/>
+              </a:solidFill>
+            </a:endParaRPr>
+          </a:p>
+        </p:txBody>
+      </p:sp>
+      <p:pic>
+        <p:nvPicPr>
+          <p:cNvPr id="2050" name="Picture 2"/>
+          <p:cNvPicPr>
+            <a:picLocks noChangeAspect="1" noChangeArrowheads="1"/>
+          </p:cNvPicPr>
+          <p:nvPr/>
+        </p:nvPicPr>
+        <p:blipFill>
+          <a:blip r:embed="rId2">
+            <a:extLst>
+              <a:ext uri="{28A0092B-C50C-407E-A947-70E740481C1C}">
+                <a14:useLocalDpi xmlns:a14="http://schemas.microsoft.com/office/drawing/2010/main" val="0"/>
+              </a:ext>
+            </a:extLst>
+          </a:blip>
+          <a:srcRect/>
+          <a:stretch>
+            <a:fillRect/>
+          </a:stretch>
+        </p:blipFill>
+        <p:spPr bwMode="auto">
+          <a:xfrm>
+            <a:off x="899592" y="2036935"/>
+            <a:ext cx="4392488" cy="3840337"/>
+          </a:xfrm>
+          <a:prstGeom prst="rect">
+            <a:avLst/>
+          </a:prstGeom>
+          <a:noFill/>
+          <a:ln>
+            <a:noFill/>
+          </a:ln>
+          <a:effectLst/>
+          <a:extLst>
+            <a:ext uri="{909E8E84-426E-40DD-AFC4-6F175D3DCCD1}">
+              <a14:hiddenFill xmlns:a14="http://schemas.microsoft.com/office/drawing/2010/main">
+                <a:solidFill>
+                  <a:schemeClr val="accent1"/>
+                </a:solidFill>
+              </a14:hiddenFill>
+            </a:ext>
+            <a:ext uri="{91240B29-F687-4F45-9708-019B960494DF}">
+              <a14:hiddenLine xmlns:a14="http://schemas.microsoft.com/office/drawing/2010/main" w="9525">
+                <a:solidFill>
+                  <a:schemeClr val="tx1"/>
+                </a:solidFill>
+                <a:miter lim="800000"/>
+                <a:headEnd/>
+                <a:tailEnd/>
+              </a14:hiddenLine>
+            </a:ext>
+            <a:ext uri="{AF507438-7753-43E0-B8FC-AC1667EBCBE1}">
+              <a14:hiddenEffects xmlns:a14="http://schemas.microsoft.com/office/drawing/2010/main">
+                <a:effectLst>
+                  <a:outerShdw dist="35921" dir="2700000" algn="ctr" rotWithShape="0">
+                    <a:schemeClr val="bg2"/>
+                  </a:outerShdw>
+                </a:effectLst>
+              </a14:hiddenEffects>
+            </a:ext>
+          </a:extLst>
+        </p:spPr>
+      </p:pic>
+      <p:pic>
+        <p:nvPicPr>
+          <p:cNvPr id="10" name="Picture 2"/>
+          <p:cNvPicPr>
+            <a:picLocks noChangeAspect="1" noChangeArrowheads="1"/>
+          </p:cNvPicPr>
+          <p:nvPr/>
+        </p:nvPicPr>
+        <p:blipFill>
+          <a:blip r:embed="rId3">
+            <a:extLst>
+              <a:ext uri="{28A0092B-C50C-407E-A947-70E740481C1C}">
+                <a14:useLocalDpi xmlns:a14="http://schemas.microsoft.com/office/drawing/2010/main" val="0"/>
+              </a:ext>
+            </a:extLst>
+          </a:blip>
+          <a:srcRect/>
+          <a:stretch>
+            <a:fillRect/>
+          </a:stretch>
+        </p:blipFill>
+        <p:spPr bwMode="auto">
+          <a:xfrm>
+            <a:off x="5436097" y="2060848"/>
+            <a:ext cx="3528392" cy="2376264"/>
+          </a:xfrm>
+          <a:prstGeom prst="rect">
+            <a:avLst/>
+          </a:prstGeom>
+          <a:noFill/>
+          <a:ln>
+            <a:noFill/>
+          </a:ln>
+          <a:effectLst/>
+          <a:extLst>
+            <a:ext uri="{909E8E84-426E-40DD-AFC4-6F175D3DCCD1}">
+              <a14:hiddenFill xmlns:a14="http://schemas.microsoft.com/office/drawing/2010/main">
+                <a:solidFill>
+                  <a:schemeClr val="accent1"/>
+                </a:solidFill>
+              </a14:hiddenFill>
+            </a:ext>
+            <a:ext uri="{91240B29-F687-4F45-9708-019B960494DF}">
+              <a14:hiddenLine xmlns:a14="http://schemas.microsoft.com/office/drawing/2010/main" w="9525">
+                <a:solidFill>
+                  <a:schemeClr val="tx1"/>
+                </a:solidFill>
+                <a:miter lim="800000"/>
+                <a:headEnd/>
+                <a:tailEnd/>
+              </a14:hiddenLine>
+            </a:ext>
+            <a:ext uri="{AF507438-7753-43E0-B8FC-AC1667EBCBE1}">
+              <a14:hiddenEffects xmlns:a14="http://schemas.microsoft.com/office/drawing/2010/main">
+                <a:effectLst>
+                  <a:outerShdw dist="35921" dir="2700000" algn="ctr" rotWithShape="0">
+                    <a:schemeClr val="bg2"/>
+                  </a:outerShdw>
+                </a:effectLst>
+              </a14:hiddenEffects>
+            </a:ext>
+          </a:extLst>
+        </p:spPr>
+      </p:pic>
+      <p:sp>
+        <p:nvSpPr>
+          <p:cNvPr id="11" name="矩形 10"/>
+          <p:cNvSpPr/>
+          <p:nvPr/>
+        </p:nvSpPr>
+        <p:spPr>
+          <a:xfrm>
+            <a:off x="5741218" y="4492277"/>
+            <a:ext cx="3079254" cy="1384995"/>
+          </a:xfrm>
+          <a:prstGeom prst="rect">
+            <a:avLst/>
+          </a:prstGeom>
+        </p:spPr>
+        <p:txBody>
+          <a:bodyPr wrap="square">
+            <a:spAutoFit/>
+          </a:bodyPr>
+          <a:lstStyle/>
+          <a:p>
+            <a:r>
+              <a:rPr lang="en-US" altLang="zh-CN" sz="1200" dirty="0" smtClean="0">
+                <a:solidFill>
+                  <a:schemeClr val="accent4"/>
+                </a:solidFill>
+              </a:rPr>
+              <a:t>     </a:t>
+            </a:r>
+            <a:r>
+              <a:rPr lang="en-US" altLang="zh-CN" sz="1200" dirty="0">
+                <a:solidFill>
+                  <a:schemeClr val="accent4"/>
+                </a:solidFill>
+              </a:rPr>
+              <a:t>- </a:t>
+            </a:r>
+            <a:r>
+              <a:rPr lang="en-US" altLang="zh-CN" sz="1200" dirty="0" smtClean="0">
+                <a:solidFill>
+                  <a:schemeClr val="accent4"/>
+                </a:solidFill>
+              </a:rPr>
+              <a:t>Director       RenegeBuilder</a:t>
+            </a:r>
+          </a:p>
+          <a:p>
+            <a:endParaRPr lang="en-US" altLang="zh-CN" sz="1200" dirty="0" smtClean="0">
+              <a:solidFill>
+                <a:schemeClr val="accent4"/>
+              </a:solidFill>
+            </a:endParaRPr>
+          </a:p>
+          <a:p>
+            <a:r>
+              <a:rPr lang="en-US" altLang="zh-CN" sz="1200" dirty="0" smtClean="0">
+                <a:solidFill>
+                  <a:schemeClr val="accent4"/>
+                </a:solidFill>
+              </a:rPr>
+              <a:t>     </a:t>
+            </a:r>
+            <a:r>
+              <a:rPr lang="en-US" altLang="zh-CN" sz="1200" dirty="0" smtClean="0">
+                <a:solidFill>
+                  <a:schemeClr val="accent4"/>
+                </a:solidFill>
+              </a:rPr>
+              <a:t>- Builder </a:t>
+            </a:r>
+            <a:r>
+              <a:rPr lang="en-US" altLang="zh-CN" sz="1200" dirty="0" smtClean="0">
+                <a:solidFill>
+                  <a:schemeClr val="accent4"/>
+                </a:solidFill>
+              </a:rPr>
+              <a:t>        </a:t>
+            </a:r>
+            <a:r>
+              <a:rPr lang="en-US" altLang="zh-CN" sz="1200" dirty="0" smtClean="0">
+                <a:solidFill>
+                  <a:schemeClr val="accent4"/>
+                </a:solidFill>
+              </a:rPr>
+              <a:t>RenegeBuilder</a:t>
+            </a:r>
+          </a:p>
+          <a:p>
+            <a:r>
+              <a:rPr lang="en-US" altLang="zh-CN" sz="1200" dirty="0">
+                <a:solidFill>
+                  <a:schemeClr val="accent4"/>
+                </a:solidFill>
+              </a:rPr>
+              <a:t> </a:t>
+            </a:r>
+            <a:r>
+              <a:rPr lang="en-US" altLang="zh-CN" sz="1200" dirty="0" smtClean="0">
+                <a:solidFill>
+                  <a:schemeClr val="accent4"/>
+                </a:solidFill>
+              </a:rPr>
+              <a:t>                            AgencyRenegeBuilder</a:t>
+            </a:r>
+          </a:p>
+          <a:p>
+            <a:r>
+              <a:rPr lang="en-US" altLang="zh-CN" sz="1200" dirty="0">
+                <a:solidFill>
+                  <a:schemeClr val="accent4"/>
+                </a:solidFill>
+              </a:rPr>
+              <a:t> </a:t>
+            </a:r>
+            <a:r>
+              <a:rPr lang="en-US" altLang="zh-CN" sz="1200" dirty="0" smtClean="0">
+                <a:solidFill>
+                  <a:schemeClr val="accent4"/>
+                </a:solidFill>
+              </a:rPr>
+              <a:t>                            TouristRenegeBuilder</a:t>
+            </a:r>
+          </a:p>
+          <a:p>
+            <a:endParaRPr lang="en-US" altLang="zh-CN" sz="1200" dirty="0" smtClean="0">
+              <a:solidFill>
+                <a:schemeClr val="accent4"/>
+              </a:solidFill>
+            </a:endParaRPr>
+          </a:p>
+          <a:p>
+            <a:r>
+              <a:rPr lang="en-US" altLang="zh-CN" sz="1200" dirty="0" smtClean="0">
+                <a:solidFill>
+                  <a:schemeClr val="accent4"/>
+                </a:solidFill>
+              </a:rPr>
+              <a:t>     </a:t>
+            </a:r>
+            <a:r>
+              <a:rPr lang="en-US" altLang="zh-CN" sz="1200" dirty="0" smtClean="0">
+                <a:solidFill>
+                  <a:schemeClr val="accent4"/>
+                </a:solidFill>
+              </a:rPr>
+              <a:t>- Product </a:t>
+            </a:r>
+            <a:r>
+              <a:rPr lang="en-US" altLang="zh-CN" sz="1200" dirty="0" smtClean="0">
+                <a:solidFill>
+                  <a:schemeClr val="accent4"/>
+                </a:solidFill>
+              </a:rPr>
+              <a:t>       String(Renege)</a:t>
+            </a:r>
+          </a:p>
+        </p:txBody>
+      </p:sp>
+    </p:spTree>
+    <p:extLst>
+      <p:ext uri="{BB962C8B-B14F-4D97-AF65-F5344CB8AC3E}">
+        <p14:creationId xmlns:p14="http://schemas.microsoft.com/office/powerpoint/2010/main" val="90084264"/>
+      </p:ext>
+    </p:extLst>
+  </p:cSld>
+  <p:clrMapOvr>
+    <a:masterClrMapping/>
+  </p:clrMapOvr>
+  <p:timing>
+    <p:tnLst>
+      <p:par>
+        <p:cTn id="1" dur="indefinite" restart="never" nodeType="tmRoot"/>
+      </p:par>
+    </p:tnLst>
+  </p:timing>
+</p:sld>
+</file>
+
+<file path=ppt/slides/slide21.xml><?xml version="1.0" encoding="utf-8"?>
+<p:sld xmlns:a="http://schemas.openxmlformats.org/drawingml/2006/main" xmlns:r="http://schemas.openxmlformats.org/officeDocument/2006/relationships" xmlns:p="http://schemas.openxmlformats.org/presentationml/2006/main">
+  <p:cSld>
+    <p:spTree>
+      <p:nvGrpSpPr>
+        <p:cNvPr id="1" name=""/>
+        <p:cNvGrpSpPr/>
+        <p:nvPr/>
+      </p:nvGrpSpPr>
+      <p:grpSpPr>
+        <a:xfrm>
+          <a:off x="0" y="0"/>
+          <a:ext cx="0" cy="0"/>
+          <a:chOff x="0" y="0"/>
+          <a:chExt cx="0" cy="0"/>
+        </a:xfrm>
+      </p:grpSpPr>
+      <p:sp>
+        <p:nvSpPr>
+          <p:cNvPr id="2" name="矩形 1"/>
+          <p:cNvSpPr/>
+          <p:nvPr/>
+        </p:nvSpPr>
+        <p:spPr>
+          <a:xfrm>
+            <a:off x="827584" y="1412776"/>
+            <a:ext cx="7632848" cy="5170646"/>
+          </a:xfrm>
+          <a:prstGeom prst="rect">
+            <a:avLst/>
+          </a:prstGeom>
+        </p:spPr>
+        <p:txBody>
+          <a:bodyPr wrap="square">
+            <a:spAutoFit/>
+          </a:bodyPr>
+          <a:lstStyle/>
+          <a:p>
+            <a:r>
+              <a:rPr lang="zh-CN" altLang="en-US" b="1" spc="50" dirty="0">
+                <a:ln w="12700">
+                  <a:noFill/>
+                  <a:prstDash val="solid"/>
+                </a:ln>
+                <a:solidFill>
+                  <a:schemeClr val="accent4"/>
+                </a:solidFill>
+                <a:effectLst>
+                  <a:outerShdw blurRad="38100" dist="38100" dir="2700000" algn="tl">
+                    <a:srgbClr val="000000">
+                      <a:alpha val="43137"/>
+                    </a:srgbClr>
+                  </a:outerShdw>
+                </a:effectLst>
+                <a:latin typeface="+mj-lt"/>
+                <a:ea typeface="+mj-ea"/>
+                <a:cs typeface="+mj-cs"/>
+              </a:rPr>
+              <a:t>共性</a:t>
+            </a:r>
+            <a:r>
+              <a:rPr lang="zh-CN" altLang="en-US" b="1" spc="50" dirty="0" smtClean="0">
+                <a:ln w="12700">
+                  <a:noFill/>
+                  <a:prstDash val="solid"/>
+                </a:ln>
+                <a:solidFill>
+                  <a:schemeClr val="accent4"/>
+                </a:solidFill>
+                <a:effectLst>
+                  <a:outerShdw blurRad="38100" dist="38100" dir="2700000" algn="tl">
+                    <a:srgbClr val="000000">
+                      <a:alpha val="43137"/>
+                    </a:srgbClr>
+                  </a:outerShdw>
+                </a:effectLst>
+                <a:latin typeface="+mj-lt"/>
+                <a:ea typeface="+mj-ea"/>
+                <a:cs typeface="+mj-cs"/>
+              </a:rPr>
+              <a:t>：</a:t>
+            </a:r>
+            <a:endParaRPr lang="en-US" altLang="zh-CN" sz="1400" dirty="0" smtClean="0">
+              <a:solidFill>
+                <a:schemeClr val="accent4"/>
+              </a:solidFill>
+            </a:endParaRPr>
+          </a:p>
+          <a:p>
+            <a:r>
+              <a:rPr lang="en-US" altLang="zh-CN" sz="1400" dirty="0">
+                <a:solidFill>
+                  <a:schemeClr val="accent4"/>
+                </a:solidFill>
+              </a:rPr>
+              <a:t>	</a:t>
+            </a:r>
+            <a:r>
+              <a:rPr lang="zh-CN" altLang="en-US" sz="1400" dirty="0" smtClean="0">
+                <a:solidFill>
+                  <a:schemeClr val="accent4"/>
+                </a:solidFill>
+              </a:rPr>
+              <a:t>创建型，封装了对象的创建</a:t>
+            </a:r>
+            <a:endParaRPr lang="en-US" altLang="zh-CN" sz="1400" dirty="0" smtClean="0">
+              <a:solidFill>
+                <a:schemeClr val="accent4"/>
+              </a:solidFill>
+            </a:endParaRPr>
+          </a:p>
+          <a:p>
+            <a:r>
+              <a:rPr lang="en-US" altLang="zh-CN" sz="1400" dirty="0">
+                <a:solidFill>
+                  <a:schemeClr val="accent4"/>
+                </a:solidFill>
+              </a:rPr>
+              <a:t>	</a:t>
+            </a:r>
+            <a:r>
+              <a:rPr lang="zh-CN" altLang="en-US" sz="1400" dirty="0" smtClean="0">
+                <a:solidFill>
+                  <a:schemeClr val="accent4"/>
+                </a:solidFill>
+              </a:rPr>
+              <a:t>支持扩展产品</a:t>
+            </a:r>
+            <a:r>
+              <a:rPr lang="en-US" altLang="zh-CN" sz="1400" dirty="0">
+                <a:solidFill>
+                  <a:schemeClr val="accent4"/>
+                </a:solidFill>
+              </a:rPr>
+              <a:t> </a:t>
+            </a:r>
+            <a:r>
+              <a:rPr lang="en-US" altLang="zh-CN" sz="1400" dirty="0" smtClean="0">
+                <a:solidFill>
+                  <a:schemeClr val="accent4"/>
+                </a:solidFill>
+              </a:rPr>
+              <a:t>/ </a:t>
+            </a:r>
+            <a:r>
+              <a:rPr lang="zh-CN" altLang="en-US" sz="1400" dirty="0" smtClean="0">
+                <a:solidFill>
+                  <a:schemeClr val="accent4"/>
+                </a:solidFill>
+              </a:rPr>
+              <a:t>产品系列</a:t>
+            </a:r>
+            <a:endParaRPr lang="en-US" altLang="zh-CN" sz="1400" dirty="0" smtClean="0">
+              <a:solidFill>
+                <a:schemeClr val="accent4"/>
+              </a:solidFill>
+            </a:endParaRPr>
+          </a:p>
+          <a:p>
+            <a:endParaRPr lang="zh-CN" altLang="en-US" sz="1400" dirty="0">
+              <a:solidFill>
+                <a:schemeClr val="accent4"/>
+              </a:solidFill>
+            </a:endParaRPr>
+          </a:p>
+          <a:p>
+            <a:r>
+              <a:rPr lang="zh-CN" altLang="en-US" b="1" spc="50" dirty="0">
+                <a:ln w="12700">
+                  <a:noFill/>
+                  <a:prstDash val="solid"/>
+                </a:ln>
+                <a:solidFill>
+                  <a:schemeClr val="accent4"/>
+                </a:solidFill>
+                <a:effectLst>
+                  <a:outerShdw blurRad="38100" dist="38100" dir="2700000" algn="tl">
+                    <a:srgbClr val="000000">
+                      <a:alpha val="43137"/>
+                    </a:srgbClr>
+                  </a:outerShdw>
+                </a:effectLst>
+                <a:latin typeface="+mj-lt"/>
+                <a:ea typeface="+mj-ea"/>
+                <a:cs typeface="+mj-cs"/>
+              </a:rPr>
+              <a:t>差异</a:t>
+            </a:r>
+            <a:r>
+              <a:rPr lang="zh-CN" altLang="en-US" b="1" spc="50" dirty="0" smtClean="0">
+                <a:ln w="12700">
+                  <a:noFill/>
+                  <a:prstDash val="solid"/>
+                </a:ln>
+                <a:solidFill>
+                  <a:schemeClr val="accent4"/>
+                </a:solidFill>
+                <a:effectLst>
+                  <a:outerShdw blurRad="38100" dist="38100" dir="2700000" algn="tl">
+                    <a:srgbClr val="000000">
+                      <a:alpha val="43137"/>
+                    </a:srgbClr>
+                  </a:outerShdw>
+                </a:effectLst>
+                <a:latin typeface="+mj-lt"/>
+                <a:ea typeface="+mj-ea"/>
+                <a:cs typeface="+mj-cs"/>
+              </a:rPr>
+              <a:t>：</a:t>
+            </a:r>
+            <a:endParaRPr lang="en-US" altLang="zh-CN" sz="1400" dirty="0" smtClean="0">
+              <a:solidFill>
+                <a:schemeClr val="accent4"/>
+              </a:solidFill>
+            </a:endParaRPr>
+          </a:p>
+          <a:p>
+            <a:r>
+              <a:rPr lang="en-US" altLang="zh-CN" sz="1400" dirty="0">
+                <a:solidFill>
+                  <a:schemeClr val="accent4"/>
+                </a:solidFill>
+              </a:rPr>
+              <a:t>	</a:t>
+            </a:r>
+            <a:r>
+              <a:rPr lang="en-US" altLang="zh-CN" sz="1400" b="1" dirty="0" smtClean="0">
+                <a:solidFill>
+                  <a:schemeClr val="accent4"/>
+                </a:solidFill>
+              </a:rPr>
+              <a:t>Factory Method</a:t>
+            </a:r>
+            <a:br>
+              <a:rPr lang="en-US" altLang="zh-CN" sz="1400" b="1" dirty="0" smtClean="0">
+                <a:solidFill>
+                  <a:schemeClr val="accent4"/>
+                </a:solidFill>
+              </a:rPr>
+            </a:br>
+            <a:endParaRPr lang="en-US" altLang="zh-CN" sz="1400" b="1" dirty="0" smtClean="0">
+              <a:solidFill>
+                <a:schemeClr val="accent4"/>
+              </a:solidFill>
+            </a:endParaRPr>
+          </a:p>
+          <a:p>
+            <a:r>
+              <a:rPr lang="en-US" altLang="zh-CN" sz="1400" dirty="0">
+                <a:solidFill>
+                  <a:schemeClr val="accent4"/>
+                </a:solidFill>
+              </a:rPr>
+              <a:t>	  </a:t>
+            </a:r>
+            <a:r>
+              <a:rPr lang="en-US" altLang="zh-CN" sz="1400" dirty="0" smtClean="0">
+                <a:solidFill>
+                  <a:schemeClr val="accent4"/>
+                </a:solidFill>
+              </a:rPr>
+              <a:t>   - </a:t>
+            </a:r>
+            <a:r>
+              <a:rPr lang="zh-CN" altLang="en-US" sz="1400" dirty="0" smtClean="0">
+                <a:solidFill>
+                  <a:schemeClr val="accent4"/>
+                </a:solidFill>
+              </a:rPr>
+              <a:t>强调</a:t>
+            </a:r>
+            <a:r>
+              <a:rPr lang="zh-CN" altLang="en-US" sz="1400" dirty="0">
+                <a:solidFill>
+                  <a:schemeClr val="accent4"/>
+                </a:solidFill>
+              </a:rPr>
+              <a:t>为</a:t>
+            </a:r>
+            <a:r>
+              <a:rPr lang="zh-CN" altLang="en-US" sz="1400" dirty="0" smtClean="0">
+                <a:solidFill>
+                  <a:schemeClr val="accent4"/>
+                </a:solidFill>
+              </a:rPr>
+              <a:t>创建单个产品提供</a:t>
+            </a:r>
+            <a:r>
+              <a:rPr lang="zh-CN" altLang="en-US" sz="1400" dirty="0">
+                <a:solidFill>
+                  <a:schemeClr val="accent4"/>
+                </a:solidFill>
+              </a:rPr>
+              <a:t>一个统一的</a:t>
+            </a:r>
+            <a:r>
+              <a:rPr lang="zh-CN" altLang="en-US" sz="1400" dirty="0" smtClean="0">
+                <a:solidFill>
+                  <a:schemeClr val="accent4"/>
+                </a:solidFill>
+              </a:rPr>
+              <a:t>接口</a:t>
+            </a:r>
+            <a:r>
+              <a:rPr lang="en-US" altLang="zh-CN" sz="1400" dirty="0" smtClean="0">
+                <a:solidFill>
+                  <a:schemeClr val="accent4"/>
+                </a:solidFill>
+              </a:rPr>
+              <a:t>(Create())</a:t>
+            </a:r>
+          </a:p>
+          <a:p>
+            <a:r>
+              <a:rPr lang="en-US" altLang="zh-CN" sz="1400" dirty="0">
+                <a:solidFill>
+                  <a:schemeClr val="accent4"/>
+                </a:solidFill>
+              </a:rPr>
+              <a:t>	 </a:t>
+            </a:r>
+            <a:r>
+              <a:rPr lang="en-US" altLang="zh-CN" sz="1400" dirty="0" smtClean="0">
+                <a:solidFill>
+                  <a:schemeClr val="accent4"/>
+                </a:solidFill>
+              </a:rPr>
+              <a:t>    - </a:t>
+            </a:r>
+            <a:r>
+              <a:rPr lang="zh-CN" altLang="en-US" sz="1400" dirty="0" smtClean="0">
+                <a:solidFill>
+                  <a:schemeClr val="accent4"/>
+                </a:solidFill>
+              </a:rPr>
+              <a:t>对产品进行了抽象，支持单个产品的扩展</a:t>
+            </a:r>
+            <a:endParaRPr lang="en-US" altLang="zh-CN" sz="1400" dirty="0" smtClean="0">
+              <a:solidFill>
+                <a:schemeClr val="accent4"/>
+              </a:solidFill>
+            </a:endParaRPr>
+          </a:p>
+          <a:p>
+            <a:r>
+              <a:rPr lang="en-US" altLang="zh-CN" sz="1400" dirty="0">
+                <a:solidFill>
+                  <a:schemeClr val="accent4"/>
+                </a:solidFill>
+              </a:rPr>
+              <a:t>	 </a:t>
+            </a:r>
+            <a:r>
+              <a:rPr lang="en-US" altLang="zh-CN" sz="1400" dirty="0" smtClean="0">
+                <a:solidFill>
+                  <a:schemeClr val="accent4"/>
+                </a:solidFill>
+              </a:rPr>
+              <a:t>    - </a:t>
+            </a:r>
+            <a:r>
+              <a:rPr lang="zh-CN" altLang="en-US" sz="1400" dirty="0" smtClean="0">
+                <a:solidFill>
+                  <a:schemeClr val="accent4"/>
+                </a:solidFill>
+              </a:rPr>
+              <a:t>直接</a:t>
+            </a:r>
+            <a:r>
+              <a:rPr lang="zh-CN" altLang="en-US" sz="1400" dirty="0">
+                <a:solidFill>
+                  <a:schemeClr val="accent4"/>
+                </a:solidFill>
+              </a:rPr>
+              <a:t>返回</a:t>
+            </a:r>
+            <a:r>
+              <a:rPr lang="zh-CN" altLang="en-US" sz="1400" dirty="0" smtClean="0">
+                <a:solidFill>
+                  <a:schemeClr val="accent4"/>
+                </a:solidFill>
+              </a:rPr>
+              <a:t>创建的产品</a:t>
+            </a:r>
+            <a:endParaRPr lang="en-US" altLang="zh-CN" sz="1400" dirty="0">
+              <a:solidFill>
+                <a:schemeClr val="accent4"/>
+              </a:solidFill>
+            </a:endParaRPr>
+          </a:p>
+          <a:p>
+            <a:endParaRPr lang="en-US" altLang="zh-CN" sz="1400" dirty="0">
+              <a:solidFill>
+                <a:schemeClr val="accent4"/>
+              </a:solidFill>
+            </a:endParaRPr>
+          </a:p>
+          <a:p>
+            <a:r>
+              <a:rPr lang="en-US" altLang="zh-CN" sz="1400" dirty="0">
+                <a:solidFill>
+                  <a:schemeClr val="accent4"/>
+                </a:solidFill>
+              </a:rPr>
+              <a:t>	</a:t>
+            </a:r>
+            <a:r>
+              <a:rPr lang="en-US" altLang="zh-CN" sz="1400" b="1" dirty="0">
+                <a:solidFill>
+                  <a:schemeClr val="accent4"/>
+                </a:solidFill>
+              </a:rPr>
+              <a:t>Abstract </a:t>
+            </a:r>
+            <a:r>
+              <a:rPr lang="en-US" altLang="zh-CN" sz="1400" b="1" dirty="0" smtClean="0">
+                <a:solidFill>
+                  <a:schemeClr val="accent4"/>
+                </a:solidFill>
+              </a:rPr>
+              <a:t>Factory</a:t>
+            </a:r>
+            <a:br>
+              <a:rPr lang="en-US" altLang="zh-CN" sz="1400" b="1" dirty="0" smtClean="0">
+                <a:solidFill>
+                  <a:schemeClr val="accent4"/>
+                </a:solidFill>
+              </a:rPr>
+            </a:br>
+            <a:endParaRPr lang="en-US" altLang="zh-CN" sz="1400" b="1" dirty="0">
+              <a:solidFill>
+                <a:schemeClr val="accent4"/>
+              </a:solidFill>
+            </a:endParaRPr>
+          </a:p>
+          <a:p>
+            <a:r>
+              <a:rPr lang="en-US" altLang="zh-CN" sz="1400" dirty="0">
+                <a:solidFill>
+                  <a:schemeClr val="accent4"/>
+                </a:solidFill>
+              </a:rPr>
+              <a:t>	     - </a:t>
+            </a:r>
+            <a:r>
+              <a:rPr lang="zh-CN" altLang="en-US" sz="1400" dirty="0">
+                <a:solidFill>
+                  <a:schemeClr val="accent4"/>
+                </a:solidFill>
+              </a:rPr>
+              <a:t>强调创建一系列产品</a:t>
+            </a:r>
+            <a:r>
+              <a:rPr lang="en-US" altLang="zh-CN" sz="1400" dirty="0">
+                <a:solidFill>
+                  <a:schemeClr val="accent4"/>
+                </a:solidFill>
+              </a:rPr>
+              <a:t>(</a:t>
+            </a:r>
+            <a:r>
+              <a:rPr lang="zh-CN" altLang="en-US" sz="1400" dirty="0">
+                <a:solidFill>
+                  <a:schemeClr val="accent4"/>
+                </a:solidFill>
+              </a:rPr>
+              <a:t>简单或复杂</a:t>
+            </a:r>
+            <a:r>
+              <a:rPr lang="en-US" altLang="zh-CN" sz="1400" dirty="0">
+                <a:solidFill>
+                  <a:schemeClr val="accent4"/>
+                </a:solidFill>
+              </a:rPr>
+              <a:t>)</a:t>
+            </a:r>
+          </a:p>
+          <a:p>
+            <a:r>
+              <a:rPr lang="en-US" altLang="zh-CN" sz="1400" dirty="0">
+                <a:solidFill>
+                  <a:schemeClr val="accent4"/>
+                </a:solidFill>
+              </a:rPr>
+              <a:t>	     - </a:t>
+            </a:r>
+            <a:r>
+              <a:rPr lang="zh-CN" altLang="en-US" sz="1400" dirty="0">
+                <a:solidFill>
+                  <a:schemeClr val="accent4"/>
+                </a:solidFill>
+              </a:rPr>
+              <a:t>对一系列产品进行了</a:t>
+            </a:r>
+            <a:r>
+              <a:rPr lang="zh-CN" altLang="en-US" sz="1400" dirty="0" smtClean="0">
+                <a:solidFill>
+                  <a:schemeClr val="accent4"/>
+                </a:solidFill>
+              </a:rPr>
+              <a:t>抽象，支持一些列产品的扩展</a:t>
+            </a:r>
+            <a:endParaRPr lang="en-US" altLang="zh-CN" sz="1400" dirty="0">
+              <a:solidFill>
+                <a:schemeClr val="accent4"/>
+              </a:solidFill>
+            </a:endParaRPr>
+          </a:p>
+          <a:p>
+            <a:r>
+              <a:rPr lang="en-US" altLang="zh-CN" sz="1400" dirty="0">
+                <a:solidFill>
+                  <a:schemeClr val="accent4"/>
+                </a:solidFill>
+              </a:rPr>
+              <a:t>	     - </a:t>
+            </a:r>
+            <a:r>
+              <a:rPr lang="zh-CN" altLang="en-US" sz="1400" dirty="0">
+                <a:solidFill>
+                  <a:schemeClr val="accent4"/>
+                </a:solidFill>
+              </a:rPr>
+              <a:t>直接返回创建的</a:t>
+            </a:r>
+            <a:r>
+              <a:rPr lang="zh-CN" altLang="en-US" sz="1400" dirty="0" smtClean="0">
+                <a:solidFill>
+                  <a:schemeClr val="accent4"/>
+                </a:solidFill>
+              </a:rPr>
+              <a:t>产品</a:t>
+            </a:r>
+            <a:endParaRPr lang="en-US" altLang="zh-CN" sz="1400" dirty="0" smtClean="0">
+              <a:solidFill>
+                <a:schemeClr val="accent4"/>
+              </a:solidFill>
+            </a:endParaRPr>
+          </a:p>
+          <a:p>
+            <a:endParaRPr lang="en-US" altLang="zh-CN" sz="1400" dirty="0">
+              <a:solidFill>
+                <a:schemeClr val="accent4"/>
+              </a:solidFill>
+            </a:endParaRPr>
+          </a:p>
+          <a:p>
+            <a:r>
+              <a:rPr lang="en-US" altLang="zh-CN" sz="1400" dirty="0">
+                <a:solidFill>
+                  <a:schemeClr val="accent4"/>
+                </a:solidFill>
+              </a:rPr>
+              <a:t>	</a:t>
+            </a:r>
+            <a:r>
+              <a:rPr lang="en-US" altLang="zh-CN" sz="1400" b="1" dirty="0" smtClean="0">
+                <a:solidFill>
+                  <a:schemeClr val="accent4"/>
+                </a:solidFill>
+              </a:rPr>
+              <a:t>Builder</a:t>
+            </a:r>
+            <a:br>
+              <a:rPr lang="en-US" altLang="zh-CN" sz="1400" b="1" dirty="0" smtClean="0">
+                <a:solidFill>
+                  <a:schemeClr val="accent4"/>
+                </a:solidFill>
+              </a:rPr>
+            </a:br>
+            <a:endParaRPr lang="en-US" altLang="zh-CN" sz="1400" b="1" dirty="0">
+              <a:solidFill>
+                <a:schemeClr val="accent4"/>
+              </a:solidFill>
+            </a:endParaRPr>
+          </a:p>
+          <a:p>
+            <a:r>
+              <a:rPr lang="en-US" altLang="zh-CN" sz="1400" dirty="0">
+                <a:solidFill>
+                  <a:schemeClr val="accent4"/>
+                </a:solidFill>
+              </a:rPr>
+              <a:t>	     - </a:t>
+            </a:r>
+            <a:r>
+              <a:rPr lang="zh-CN" altLang="en-US" sz="1400" dirty="0" smtClean="0">
+                <a:solidFill>
+                  <a:schemeClr val="accent4"/>
+                </a:solidFill>
+              </a:rPr>
+              <a:t>强调</a:t>
+            </a:r>
+            <a:r>
+              <a:rPr lang="zh-CN" altLang="en-US" sz="1400" dirty="0">
+                <a:solidFill>
+                  <a:schemeClr val="accent4"/>
+                </a:solidFill>
+              </a:rPr>
+              <a:t>一步一</a:t>
+            </a:r>
+            <a:r>
+              <a:rPr lang="zh-CN" altLang="en-US" sz="1400" dirty="0" smtClean="0">
+                <a:solidFill>
+                  <a:schemeClr val="accent4"/>
+                </a:solidFill>
+              </a:rPr>
+              <a:t>步的创建产品</a:t>
+            </a:r>
+            <a:r>
+              <a:rPr lang="zh-CN" altLang="en-US" sz="1400" dirty="0">
+                <a:solidFill>
+                  <a:schemeClr val="accent4"/>
+                </a:solidFill>
+              </a:rPr>
+              <a:t>，以及产品内部</a:t>
+            </a:r>
+            <a:r>
+              <a:rPr lang="zh-CN" altLang="en-US" sz="1400" dirty="0" smtClean="0">
+                <a:solidFill>
+                  <a:schemeClr val="accent4"/>
+                </a:solidFill>
+              </a:rPr>
+              <a:t>复杂性</a:t>
+            </a:r>
+            <a:endParaRPr lang="en-US" altLang="zh-CN" sz="1400" dirty="0" smtClean="0">
+              <a:solidFill>
+                <a:schemeClr val="accent4"/>
+              </a:solidFill>
+            </a:endParaRPr>
+          </a:p>
+          <a:p>
+            <a:r>
+              <a:rPr lang="en-US" altLang="zh-CN" sz="1400" dirty="0">
+                <a:solidFill>
+                  <a:schemeClr val="accent4"/>
+                </a:solidFill>
+              </a:rPr>
+              <a:t>	</a:t>
+            </a:r>
+            <a:r>
+              <a:rPr lang="en-US" altLang="zh-CN" sz="1400" dirty="0" smtClean="0">
+                <a:solidFill>
+                  <a:schemeClr val="accent4"/>
+                </a:solidFill>
+              </a:rPr>
+              <a:t>     - </a:t>
+            </a:r>
+            <a:r>
+              <a:rPr lang="zh-CN" altLang="en-US" sz="1400" dirty="0" smtClean="0">
+                <a:solidFill>
+                  <a:schemeClr val="accent4"/>
+                </a:solidFill>
+              </a:rPr>
+              <a:t>强调分离产品构建过程及其具体表示，相同的构建过程创建不同的表示</a:t>
+            </a:r>
+            <a:endParaRPr lang="en-US" altLang="zh-CN" sz="1400" dirty="0" smtClean="0">
+              <a:solidFill>
+                <a:schemeClr val="accent4"/>
+              </a:solidFill>
+            </a:endParaRPr>
+          </a:p>
+          <a:p>
+            <a:r>
+              <a:rPr lang="en-US" altLang="zh-CN" sz="1400" dirty="0" smtClean="0">
+                <a:solidFill>
+                  <a:schemeClr val="accent4"/>
+                </a:solidFill>
+              </a:rPr>
+              <a:t>	     - </a:t>
+            </a:r>
+            <a:r>
+              <a:rPr lang="zh-CN" altLang="en-US" sz="1400" dirty="0" smtClean="0">
+                <a:solidFill>
+                  <a:schemeClr val="accent4"/>
+                </a:solidFill>
+              </a:rPr>
+              <a:t>不要求对产品进行抽象，通过扩展</a:t>
+            </a:r>
+            <a:r>
+              <a:rPr lang="en-US" altLang="zh-CN" sz="1400" dirty="0" smtClean="0">
+                <a:solidFill>
+                  <a:schemeClr val="accent4"/>
+                </a:solidFill>
+              </a:rPr>
+              <a:t>Builder</a:t>
+            </a:r>
+            <a:r>
+              <a:rPr lang="zh-CN" altLang="en-US" sz="1400" dirty="0" smtClean="0">
+                <a:solidFill>
+                  <a:schemeClr val="accent4"/>
+                </a:solidFill>
+              </a:rPr>
+              <a:t>来改变产品的内部表示</a:t>
+            </a:r>
+            <a:endParaRPr lang="en-US" altLang="zh-CN" sz="1400" dirty="0" smtClean="0">
+              <a:solidFill>
+                <a:schemeClr val="accent4"/>
+              </a:solidFill>
+            </a:endParaRPr>
+          </a:p>
+          <a:p>
+            <a:r>
+              <a:rPr lang="en-US" altLang="zh-CN" sz="1400" dirty="0">
+                <a:solidFill>
+                  <a:schemeClr val="accent4"/>
+                </a:solidFill>
+              </a:rPr>
+              <a:t>	     - </a:t>
+            </a:r>
+            <a:r>
+              <a:rPr lang="zh-CN" altLang="en-US" sz="1400" dirty="0" smtClean="0">
+                <a:solidFill>
+                  <a:schemeClr val="accent4"/>
+                </a:solidFill>
+              </a:rPr>
+              <a:t>不要求统一的接口</a:t>
+            </a:r>
+            <a:r>
+              <a:rPr lang="en-US" altLang="zh-CN" sz="1400" dirty="0" smtClean="0">
+                <a:solidFill>
+                  <a:schemeClr val="accent4"/>
+                </a:solidFill>
+              </a:rPr>
+              <a:t>(GetProduct())</a:t>
+            </a:r>
+            <a:r>
+              <a:rPr lang="zh-CN" altLang="en-US" sz="1400" dirty="0" smtClean="0">
+                <a:solidFill>
+                  <a:schemeClr val="accent4"/>
+                </a:solidFill>
+              </a:rPr>
+              <a:t>，具体</a:t>
+            </a:r>
+            <a:r>
+              <a:rPr lang="en-US" altLang="zh-CN" sz="1400" dirty="0" smtClean="0">
+                <a:solidFill>
+                  <a:schemeClr val="accent4"/>
+                </a:solidFill>
+              </a:rPr>
+              <a:t>Builder</a:t>
+            </a:r>
+            <a:r>
+              <a:rPr lang="zh-CN" altLang="en-US" sz="1400" dirty="0" smtClean="0">
+                <a:solidFill>
+                  <a:schemeClr val="accent4"/>
+                </a:solidFill>
+              </a:rPr>
+              <a:t>返回具体</a:t>
+            </a:r>
+            <a:r>
+              <a:rPr lang="en-US" altLang="zh-CN" sz="1400" dirty="0" smtClean="0">
+                <a:solidFill>
+                  <a:schemeClr val="accent4"/>
+                </a:solidFill>
+              </a:rPr>
+              <a:t>Product</a:t>
+            </a:r>
+            <a:endParaRPr lang="zh-CN" altLang="en-US" sz="1400" dirty="0">
+              <a:solidFill>
+                <a:schemeClr val="accent4"/>
+              </a:solidFill>
+            </a:endParaRPr>
+          </a:p>
+        </p:txBody>
+      </p:sp>
+      <p:sp>
+        <p:nvSpPr>
+          <p:cNvPr id="3" name="Rectangle 2"/>
+          <p:cNvSpPr txBox="1">
+            <a:spLocks noChangeArrowheads="1"/>
+          </p:cNvSpPr>
+          <p:nvPr/>
+        </p:nvSpPr>
+        <p:spPr>
+          <a:xfrm>
+            <a:off x="628650" y="44624"/>
+            <a:ext cx="7886700" cy="1119658"/>
+          </a:xfrm>
+          <a:prstGeom prst="rect">
+            <a:avLst/>
+          </a:prstGeom>
+        </p:spPr>
+        <p:txBody>
+          <a:bodyPr vert="horz" lIns="91440" tIns="45720" rIns="91440" bIns="45720" rtlCol="0" anchor="ctr">
+            <a:normAutofit/>
+          </a:bodyPr>
+          <a:lstStyle>
+            <a:lvl1pPr algn="ctr" defTabSz="914400" rtl="0" eaLnBrk="1" latinLnBrk="0" hangingPunct="1">
+              <a:spcBef>
+                <a:spcPct val="0"/>
+              </a:spcBef>
+              <a:buNone/>
+              <a:defRPr sz="4400" kern="1200">
+                <a:solidFill>
+                  <a:schemeClr val="tx1"/>
+                </a:solidFill>
+                <a:latin typeface="+mj-lt"/>
+                <a:ea typeface="+mj-ea"/>
+                <a:cs typeface="+mj-cs"/>
+              </a:defRPr>
+            </a:lvl1pPr>
+          </a:lstStyle>
+          <a:p>
+            <a:r>
+              <a:rPr lang="en-US" altLang="zh-CN" sz="3200" dirty="0"/>
+              <a:t>Builder &amp; Factory Method &amp; Abstract Factory</a:t>
+            </a:r>
+            <a:endParaRPr lang="zh-CN" altLang="en-US" sz="3200" dirty="0"/>
+          </a:p>
+        </p:txBody>
+      </p:sp>
+    </p:spTree>
+    <p:extLst>
+      <p:ext uri="{BB962C8B-B14F-4D97-AF65-F5344CB8AC3E}">
+        <p14:creationId xmlns:p14="http://schemas.microsoft.com/office/powerpoint/2010/main" val="2747582457"/>
+      </p:ext>
+    </p:extLst>
+  </p:cSld>
+  <p:clrMapOvr>
+    <a:masterClrMapping/>
+  </p:clrMapOvr>
+  <p:timing>
+    <p:tnLst>
+      <p:par>
+        <p:cTn id="1" dur="indefinite" restart="never" nodeType="tmRoot"/>
+      </p:par>
+    </p:tnLst>
+  </p:timing>
+</p:sld>
+</file>
+
+<file path=ppt/slides/slide22.xml><?xml version="1.0" encoding="utf-8"?>
+<p:sld xmlns:a="http://schemas.openxmlformats.org/drawingml/2006/main" xmlns:r="http://schemas.openxmlformats.org/officeDocument/2006/relationships" xmlns:p="http://schemas.openxmlformats.org/presentationml/2006/main">
+  <p:cSld>
+    <p:spTree>
+      <p:nvGrpSpPr>
+        <p:cNvPr id="1" name=""/>
+        <p:cNvGrpSpPr/>
+        <p:nvPr/>
+      </p:nvGrpSpPr>
+      <p:grpSpPr>
+        <a:xfrm>
+          <a:off x="0" y="0"/>
+          <a:ext cx="0" cy="0"/>
+          <a:chOff x="0" y="0"/>
+          <a:chExt cx="0" cy="0"/>
+        </a:xfrm>
+      </p:grpSpPr>
+      <p:sp>
+        <p:nvSpPr>
           <p:cNvPr id="72711" name="Rectangle 7"/>
           <p:cNvSpPr>
             <a:spLocks noGrp="1" noChangeArrowheads="1"/>
@@ -12246,7 +13219,7 @@
 </p:sld>
 </file>
 
-<file path=ppt/slides/slide21.xml><?xml version="1.0" encoding="utf-8"?>
+<file path=ppt/slides/slide23.xml><?xml version="1.0" encoding="utf-8"?>
 <p:sld xmlns:a="http://schemas.openxmlformats.org/drawingml/2006/main" xmlns:r="http://schemas.openxmlformats.org/officeDocument/2006/relationships" xmlns:p="http://schemas.openxmlformats.org/presentationml/2006/main">
   <p:cSld>
     <p:spTree>

</xml_diff>